<commit_message>
Final Presentation visual enhancement
</commit_message>
<xml_diff>
--- a/Final Presentation.pptx
+++ b/Final Presentation.pptx
@@ -229,6 +229,11 @@
       </a:defRPr>
     </a:lvl9pPr>
   </p:defaultTextStyle>
+  <p:extLst>
+    <p:ext uri="{EFAFB233-063F-42B5-8137-9DF3F51BA10A}">
+      <p15:sldGuideLst xmlns:p15="http://schemas.microsoft.com/office/powerpoint/2012/main"/>
+    </p:ext>
+  </p:extLst>
 </p:presentation>
 </file>
 
@@ -11370,17 +11375,17 @@
           <a:bodyPr lIns="91425" tIns="45700" rIns="91425" bIns="45700" anchor="ctr" anchorCtr="0">
             <a:noAutofit/>
           </a:bodyPr>
-          <a:lstStyle/>
+          <a:lstStyle>
+            <a:lvl1pPr>
+              <a:defRPr sz="1200"/>
+            </a:lvl1pPr>
+          </a:lstStyle>
           <a:p>
-            <a:pPr marL="0" marR="0" lvl="0" indent="0" algn="r" rtl="0">
-              <a:spcBef>
-                <a:spcPts val="0"/>
-              </a:spcBef>
+            <a:pPr algn="r">
               <a:buSzPct val="25000"/>
-              <a:buNone/>
             </a:pPr>
             <a:fld id="{00000000-1234-1234-1234-123412341234}" type="slidenum">
-              <a:rPr lang="en-US" sz="1200">
+              <a:rPr lang="en-US" smtClean="0">
                 <a:solidFill>
                   <a:srgbClr val="888888"/>
                 </a:solidFill>
@@ -11389,9 +11394,12 @@
                 <a:cs typeface="Calibri"/>
                 <a:sym typeface="Calibri"/>
               </a:rPr>
+              <a:pPr algn="r">
+                <a:buSzPct val="25000"/>
+              </a:pPr>
               <a:t>‹Nr.›</a:t>
             </a:fld>
-            <a:endParaRPr lang="en-US" sz="1200">
+            <a:endParaRPr lang="en-US" dirty="0">
               <a:solidFill>
                 <a:srgbClr val="888888"/>
               </a:solidFill>
@@ -16548,17 +16556,17 @@
           <a:bodyPr lIns="91425" tIns="45700" rIns="91425" bIns="45700" anchor="ctr" anchorCtr="0">
             <a:noAutofit/>
           </a:bodyPr>
-          <a:lstStyle/>
+          <a:lstStyle>
+            <a:lvl1pPr>
+              <a:defRPr sz="1200"/>
+            </a:lvl1pPr>
+          </a:lstStyle>
           <a:p>
-            <a:pPr marL="0" marR="0" lvl="0" indent="0" algn="r" rtl="0">
-              <a:spcBef>
-                <a:spcPts val="0"/>
-              </a:spcBef>
+            <a:pPr algn="r">
               <a:buSzPct val="25000"/>
-              <a:buNone/>
             </a:pPr>
             <a:fld id="{00000000-1234-1234-1234-123412341234}" type="slidenum">
-              <a:rPr lang="en-US" sz="1200" b="0" i="0" u="none" strike="noStrike" cap="none">
+              <a:rPr lang="en-US" smtClean="0">
                 <a:solidFill>
                   <a:srgbClr val="888888"/>
                 </a:solidFill>
@@ -16567,9 +16575,12 @@
                 <a:cs typeface="Calibri"/>
                 <a:sym typeface="Calibri"/>
               </a:rPr>
+              <a:pPr algn="r">
+                <a:buSzPct val="25000"/>
+              </a:pPr>
               <a:t>‹Nr.›</a:t>
             </a:fld>
-            <a:endParaRPr lang="en-US" sz="1200" b="0" i="0" u="none" strike="noStrike" cap="none">
+            <a:endParaRPr lang="en-US" dirty="0">
               <a:solidFill>
                 <a:srgbClr val="888888"/>
               </a:solidFill>
@@ -18070,16 +18081,7 @@
                 <a:cs typeface="Calibri"/>
                 <a:sym typeface="Calibri"/>
               </a:rPr>
-              <a:t>Final </a:t>
-            </a:r>
-            <a:r>
-              <a:rPr lang="en-US" sz="3200" dirty="0" smtClean="0">
-                <a:latin typeface="Calibri"/>
-                <a:ea typeface="Calibri"/>
-                <a:cs typeface="Calibri"/>
-                <a:sym typeface="Calibri"/>
-              </a:rPr>
-              <a:t>Presentation</a:t>
+              <a:t>Final Presentation</a:t>
             </a:r>
           </a:p>
           <a:p>
@@ -18090,7 +18092,7 @@
               <a:buSzPct val="25000"/>
               <a:buNone/>
             </a:pPr>
-            <a:endParaRPr lang="en-US" sz="3200" dirty="0" smtClean="0">
+            <a:endParaRPr lang="en-US" sz="3200" dirty="0">
               <a:latin typeface="Calibri"/>
               <a:ea typeface="Calibri"/>
               <a:cs typeface="Calibri"/>
@@ -18111,19 +18113,7 @@
                 <a:cs typeface="Calibri"/>
                 <a:sym typeface="Calibri"/>
               </a:rPr>
-              <a:t>Thomas </a:t>
-            </a:r>
-            <a:r>
-              <a:rPr lang="en-US" sz="2200" dirty="0" smtClean="0">
-                <a:solidFill>
-                  <a:srgbClr val="404040"/>
-                </a:solidFill>
-                <a:latin typeface="Calibri"/>
-                <a:ea typeface="Calibri"/>
-                <a:cs typeface="Calibri"/>
-                <a:sym typeface="Calibri"/>
-              </a:rPr>
-              <a:t>Meier</a:t>
+              <a:t>Thomas Meier</a:t>
             </a:r>
           </a:p>
           <a:p>
@@ -18143,7 +18133,7 @@
               <a:t>Isa </a:t>
             </a:r>
             <a:r>
-              <a:rPr lang="en-US" sz="2200" dirty="0" err="1" smtClean="0">
+              <a:rPr lang="en-US" sz="2200" dirty="0" err="1">
                 <a:solidFill>
                   <a:srgbClr val="404040"/>
                 </a:solidFill>
@@ -18231,7 +18221,7 @@
               <a:t>Samuel </a:t>
             </a:r>
             <a:r>
-              <a:rPr lang="en-US" sz="2200" dirty="0" err="1" smtClean="0">
+              <a:rPr lang="en-US" sz="2200" dirty="0" err="1">
                 <a:solidFill>
                   <a:srgbClr val="404040"/>
                 </a:solidFill>
@@ -18372,13 +18362,6 @@
   <p:clrMapOvr>
     <a:masterClrMapping/>
   </p:clrMapOvr>
-  <p:timing>
-    <p:tnLst>
-      <p:par>
-        <p:cTn id="1" dur="indefinite" restart="never" nodeType="tmRoot"/>
-      </p:par>
-    </p:tnLst>
-  </p:timing>
 </p:sld>
 </file>
 
@@ -18399,50 +18382,6 @@
           <a:chExt cx="0" cy="0"/>
         </a:xfrm>
       </p:grpSpPr>
-      <p:sp>
-        <p:nvSpPr>
-          <p:cNvPr id="346" name="Shape 346"/>
-          <p:cNvSpPr txBox="1">
-            <a:spLocks noGrp="1"/>
-          </p:cNvSpPr>
-          <p:nvPr>
-            <p:ph type="sldNum" idx="12"/>
-          </p:nvPr>
-        </p:nvSpPr>
-        <p:spPr>
-          <a:xfrm>
-            <a:off x="6457950" y="6356351"/>
-            <a:ext cx="2057400" cy="365099"/>
-          </a:xfrm>
-          <a:prstGeom prst="rect">
-            <a:avLst/>
-          </a:prstGeom>
-        </p:spPr>
-        <p:txBody>
-          <a:bodyPr lIns="91425" tIns="45700" rIns="91425" bIns="45700" anchor="ctr" anchorCtr="0">
-            <a:noAutofit/>
-          </a:bodyPr>
-          <a:lstStyle/>
-          <a:p>
-            <a:pPr lvl="0" rtl="0">
-              <a:spcBef>
-                <a:spcPts val="0"/>
-              </a:spcBef>
-              <a:buClr>
-                <a:srgbClr val="000000"/>
-              </a:buClr>
-              <a:buSzPct val="25000"/>
-              <a:buFont typeface="Arial"/>
-              <a:buNone/>
-            </a:pPr>
-            <a:fld id="{00000000-1234-1234-1234-123412341234}" type="slidenum">
-              <a:rPr lang="en-US"/>
-              <a:t>10</a:t>
-            </a:fld>
-            <a:endParaRPr lang="en-US"/>
-          </a:p>
-        </p:txBody>
-      </p:sp>
       <p:sp>
         <p:nvSpPr>
           <p:cNvPr id="347" name="Shape 347"/>
@@ -18593,18 +18532,57 @@
           </a:p>
         </p:txBody>
       </p:sp>
+      <p:sp>
+        <p:nvSpPr>
+          <p:cNvPr id="6" name="Foliennummernplatzhalter 5"/>
+          <p:cNvSpPr>
+            <a:spLocks noGrp="1"/>
+          </p:cNvSpPr>
+          <p:nvPr>
+            <p:ph type="sldNum" idx="12"/>
+          </p:nvPr>
+        </p:nvSpPr>
+        <p:spPr/>
+        <p:txBody>
+          <a:bodyPr/>
+          <a:lstStyle/>
+          <a:p>
+            <a:pPr marL="0" marR="0" lvl="0" indent="0" algn="r" rtl="0">
+              <a:spcBef>
+                <a:spcPts val="0"/>
+              </a:spcBef>
+              <a:buSzPct val="25000"/>
+              <a:buNone/>
+            </a:pPr>
+            <a:fld id="{00000000-1234-1234-1234-123412341234}" type="slidenum">
+              <a:rPr lang="en-US" sz="1200" smtClean="0">
+                <a:solidFill>
+                  <a:srgbClr val="888888"/>
+                </a:solidFill>
+                <a:latin typeface="Calibri"/>
+                <a:ea typeface="Calibri"/>
+                <a:cs typeface="Calibri"/>
+                <a:sym typeface="Calibri"/>
+              </a:rPr>
+              <a:t>10</a:t>
+            </a:fld>
+            <a:endParaRPr lang="en-US" sz="1200">
+              <a:solidFill>
+                <a:srgbClr val="888888"/>
+              </a:solidFill>
+              <a:latin typeface="Calibri"/>
+              <a:ea typeface="Calibri"/>
+              <a:cs typeface="Calibri"/>
+              <a:sym typeface="Calibri"/>
+            </a:endParaRPr>
+          </a:p>
+        </p:txBody>
+      </p:sp>
     </p:spTree>
   </p:cSld>
   <p:clrMapOvr>
     <a:masterClrMapping/>
   </p:clrMapOvr>
-  <p:timing>
-    <p:tnLst>
-      <p:par>
-        <p:cTn id="1" dur="indefinite" restart="never" nodeType="tmRoot"/>
-      </p:par>
-    </p:tnLst>
-  </p:timing>
 </p:sld>
 </file>
 
@@ -18625,50 +18603,6 @@
           <a:chExt cx="0" cy="0"/>
         </a:xfrm>
       </p:grpSpPr>
-      <p:sp>
-        <p:nvSpPr>
-          <p:cNvPr id="356" name="Shape 356"/>
-          <p:cNvSpPr txBox="1">
-            <a:spLocks noGrp="1"/>
-          </p:cNvSpPr>
-          <p:nvPr>
-            <p:ph type="sldNum" idx="12"/>
-          </p:nvPr>
-        </p:nvSpPr>
-        <p:spPr>
-          <a:xfrm>
-            <a:off x="6457950" y="6356351"/>
-            <a:ext cx="2057400" cy="365099"/>
-          </a:xfrm>
-          <a:prstGeom prst="rect">
-            <a:avLst/>
-          </a:prstGeom>
-        </p:spPr>
-        <p:txBody>
-          <a:bodyPr lIns="91425" tIns="45700" rIns="91425" bIns="45700" anchor="ctr" anchorCtr="0">
-            <a:noAutofit/>
-          </a:bodyPr>
-          <a:lstStyle/>
-          <a:p>
-            <a:pPr lvl="0" rtl="0">
-              <a:spcBef>
-                <a:spcPts val="0"/>
-              </a:spcBef>
-              <a:buClr>
-                <a:srgbClr val="000000"/>
-              </a:buClr>
-              <a:buSzPct val="25000"/>
-              <a:buFont typeface="Arial"/>
-              <a:buNone/>
-            </a:pPr>
-            <a:fld id="{00000000-1234-1234-1234-123412341234}" type="slidenum">
-              <a:rPr lang="en-US"/>
-              <a:t>11</a:t>
-            </a:fld>
-            <a:endParaRPr lang="en-US"/>
-          </a:p>
-        </p:txBody>
-      </p:sp>
       <p:sp>
         <p:nvSpPr>
           <p:cNvPr id="357" name="Shape 357"/>
@@ -18735,18 +18669,57 @@
           </a:ln>
         </p:spPr>
       </p:pic>
+      <p:sp>
+        <p:nvSpPr>
+          <p:cNvPr id="6" name="Foliennummernplatzhalter 5"/>
+          <p:cNvSpPr>
+            <a:spLocks noGrp="1"/>
+          </p:cNvSpPr>
+          <p:nvPr>
+            <p:ph type="sldNum" idx="12"/>
+          </p:nvPr>
+        </p:nvSpPr>
+        <p:spPr/>
+        <p:txBody>
+          <a:bodyPr/>
+          <a:lstStyle/>
+          <a:p>
+            <a:pPr marL="0" marR="0" lvl="0" indent="0" algn="r" rtl="0">
+              <a:spcBef>
+                <a:spcPts val="0"/>
+              </a:spcBef>
+              <a:buSzPct val="25000"/>
+              <a:buNone/>
+            </a:pPr>
+            <a:fld id="{00000000-1234-1234-1234-123412341234}" type="slidenum">
+              <a:rPr lang="en-US" sz="1200" smtClean="0">
+                <a:solidFill>
+                  <a:srgbClr val="888888"/>
+                </a:solidFill>
+                <a:latin typeface="Calibri"/>
+                <a:ea typeface="Calibri"/>
+                <a:cs typeface="Calibri"/>
+                <a:sym typeface="Calibri"/>
+              </a:rPr>
+              <a:t>11</a:t>
+            </a:fld>
+            <a:endParaRPr lang="en-US" sz="1200">
+              <a:solidFill>
+                <a:srgbClr val="888888"/>
+              </a:solidFill>
+              <a:latin typeface="Calibri"/>
+              <a:ea typeface="Calibri"/>
+              <a:cs typeface="Calibri"/>
+              <a:sym typeface="Calibri"/>
+            </a:endParaRPr>
+          </a:p>
+        </p:txBody>
+      </p:sp>
     </p:spTree>
   </p:cSld>
   <p:clrMapOvr>
     <a:masterClrMapping/>
   </p:clrMapOvr>
-  <p:timing>
-    <p:tnLst>
-      <p:par>
-        <p:cTn id="1" dur="indefinite" restart="never" nodeType="tmRoot"/>
-      </p:par>
-    </p:tnLst>
-  </p:timing>
 </p:sld>
 </file>
 
@@ -18767,50 +18740,6 @@
           <a:chExt cx="0" cy="0"/>
         </a:xfrm>
       </p:grpSpPr>
-      <p:sp>
-        <p:nvSpPr>
-          <p:cNvPr id="364" name="Shape 364"/>
-          <p:cNvSpPr txBox="1">
-            <a:spLocks noGrp="1"/>
-          </p:cNvSpPr>
-          <p:nvPr>
-            <p:ph type="sldNum" idx="12"/>
-          </p:nvPr>
-        </p:nvSpPr>
-        <p:spPr>
-          <a:xfrm>
-            <a:off x="6457950" y="6356351"/>
-            <a:ext cx="2057400" cy="365099"/>
-          </a:xfrm>
-          <a:prstGeom prst="rect">
-            <a:avLst/>
-          </a:prstGeom>
-        </p:spPr>
-        <p:txBody>
-          <a:bodyPr lIns="91425" tIns="45700" rIns="91425" bIns="45700" anchor="ctr" anchorCtr="0">
-            <a:noAutofit/>
-          </a:bodyPr>
-          <a:lstStyle/>
-          <a:p>
-            <a:pPr lvl="0" rtl="0">
-              <a:spcBef>
-                <a:spcPts val="0"/>
-              </a:spcBef>
-              <a:buClr>
-                <a:srgbClr val="000000"/>
-              </a:buClr>
-              <a:buSzPct val="25000"/>
-              <a:buFont typeface="Arial"/>
-              <a:buNone/>
-            </a:pPr>
-            <a:fld id="{00000000-1234-1234-1234-123412341234}" type="slidenum">
-              <a:rPr lang="en-US"/>
-              <a:t>12</a:t>
-            </a:fld>
-            <a:endParaRPr lang="en-US"/>
-          </a:p>
-        </p:txBody>
-      </p:sp>
       <p:sp>
         <p:nvSpPr>
           <p:cNvPr id="365" name="Shape 365"/>
@@ -18947,18 +18876,57 @@
           </a:p>
         </p:txBody>
       </p:sp>
+      <p:sp>
+        <p:nvSpPr>
+          <p:cNvPr id="6" name="Foliennummernplatzhalter 5"/>
+          <p:cNvSpPr>
+            <a:spLocks noGrp="1"/>
+          </p:cNvSpPr>
+          <p:nvPr>
+            <p:ph type="sldNum" idx="12"/>
+          </p:nvPr>
+        </p:nvSpPr>
+        <p:spPr/>
+        <p:txBody>
+          <a:bodyPr/>
+          <a:lstStyle/>
+          <a:p>
+            <a:pPr marL="0" marR="0" lvl="0" indent="0" algn="r" rtl="0">
+              <a:spcBef>
+                <a:spcPts val="0"/>
+              </a:spcBef>
+              <a:buSzPct val="25000"/>
+              <a:buNone/>
+            </a:pPr>
+            <a:fld id="{00000000-1234-1234-1234-123412341234}" type="slidenum">
+              <a:rPr lang="en-US" sz="1200" smtClean="0">
+                <a:solidFill>
+                  <a:srgbClr val="888888"/>
+                </a:solidFill>
+                <a:latin typeface="Calibri"/>
+                <a:ea typeface="Calibri"/>
+                <a:cs typeface="Calibri"/>
+                <a:sym typeface="Calibri"/>
+              </a:rPr>
+              <a:t>12</a:t>
+            </a:fld>
+            <a:endParaRPr lang="en-US" sz="1200">
+              <a:solidFill>
+                <a:srgbClr val="888888"/>
+              </a:solidFill>
+              <a:latin typeface="Calibri"/>
+              <a:ea typeface="Calibri"/>
+              <a:cs typeface="Calibri"/>
+              <a:sym typeface="Calibri"/>
+            </a:endParaRPr>
+          </a:p>
+        </p:txBody>
+      </p:sp>
     </p:spTree>
   </p:cSld>
   <p:clrMapOvr>
     <a:masterClrMapping/>
   </p:clrMapOvr>
-  <p:timing>
-    <p:tnLst>
-      <p:par>
-        <p:cTn id="1" dur="indefinite" restart="never" nodeType="tmRoot"/>
-      </p:par>
-    </p:tnLst>
-  </p:timing>
 </p:sld>
 </file>
 
@@ -19009,50 +18977,6 @@
       </p:pic>
       <p:sp>
         <p:nvSpPr>
-          <p:cNvPr id="374" name="Shape 374"/>
-          <p:cNvSpPr txBox="1">
-            <a:spLocks noGrp="1"/>
-          </p:cNvSpPr>
-          <p:nvPr>
-            <p:ph type="sldNum" idx="12"/>
-          </p:nvPr>
-        </p:nvSpPr>
-        <p:spPr>
-          <a:xfrm>
-            <a:off x="6457950" y="6356351"/>
-            <a:ext cx="2057400" cy="365099"/>
-          </a:xfrm>
-          <a:prstGeom prst="rect">
-            <a:avLst/>
-          </a:prstGeom>
-        </p:spPr>
-        <p:txBody>
-          <a:bodyPr lIns="91425" tIns="45700" rIns="91425" bIns="45700" anchor="ctr" anchorCtr="0">
-            <a:noAutofit/>
-          </a:bodyPr>
-          <a:lstStyle/>
-          <a:p>
-            <a:pPr lvl="0" rtl="0">
-              <a:spcBef>
-                <a:spcPts val="0"/>
-              </a:spcBef>
-              <a:buClr>
-                <a:srgbClr val="000000"/>
-              </a:buClr>
-              <a:buSzPct val="25000"/>
-              <a:buFont typeface="Arial"/>
-              <a:buNone/>
-            </a:pPr>
-            <a:fld id="{00000000-1234-1234-1234-123412341234}" type="slidenum">
-              <a:rPr lang="en-US"/>
-              <a:t>13</a:t>
-            </a:fld>
-            <a:endParaRPr lang="en-US"/>
-          </a:p>
-        </p:txBody>
-      </p:sp>
-      <p:sp>
-        <p:nvSpPr>
           <p:cNvPr id="375" name="Shape 375"/>
           <p:cNvSpPr txBox="1">
             <a:spLocks noGrp="1"/>
@@ -19159,18 +19083,57 @@
           </a:p>
         </p:txBody>
       </p:sp>
+      <p:sp>
+        <p:nvSpPr>
+          <p:cNvPr id="6" name="Foliennummernplatzhalter 5"/>
+          <p:cNvSpPr>
+            <a:spLocks noGrp="1"/>
+          </p:cNvSpPr>
+          <p:nvPr>
+            <p:ph type="sldNum" idx="12"/>
+          </p:nvPr>
+        </p:nvSpPr>
+        <p:spPr/>
+        <p:txBody>
+          <a:bodyPr/>
+          <a:lstStyle/>
+          <a:p>
+            <a:pPr marL="0" marR="0" lvl="0" indent="0" algn="r" rtl="0">
+              <a:spcBef>
+                <a:spcPts val="0"/>
+              </a:spcBef>
+              <a:buSzPct val="25000"/>
+              <a:buNone/>
+            </a:pPr>
+            <a:fld id="{00000000-1234-1234-1234-123412341234}" type="slidenum">
+              <a:rPr lang="en-US" sz="1200" smtClean="0">
+                <a:solidFill>
+                  <a:srgbClr val="888888"/>
+                </a:solidFill>
+                <a:latin typeface="Calibri"/>
+                <a:ea typeface="Calibri"/>
+                <a:cs typeface="Calibri"/>
+                <a:sym typeface="Calibri"/>
+              </a:rPr>
+              <a:t>13</a:t>
+            </a:fld>
+            <a:endParaRPr lang="en-US" sz="1200">
+              <a:solidFill>
+                <a:srgbClr val="888888"/>
+              </a:solidFill>
+              <a:latin typeface="Calibri"/>
+              <a:ea typeface="Calibri"/>
+              <a:cs typeface="Calibri"/>
+              <a:sym typeface="Calibri"/>
+            </a:endParaRPr>
+          </a:p>
+        </p:txBody>
+      </p:sp>
     </p:spTree>
   </p:cSld>
   <p:clrMapOvr>
     <a:masterClrMapping/>
   </p:clrMapOvr>
-  <p:timing>
-    <p:tnLst>
-      <p:par>
-        <p:cTn id="1" dur="indefinite" restart="never" nodeType="tmRoot"/>
-      </p:par>
-    </p:tnLst>
-  </p:timing>
 </p:sld>
 </file>
 
@@ -19191,50 +19154,6 @@
           <a:chExt cx="0" cy="0"/>
         </a:xfrm>
       </p:grpSpPr>
-      <p:sp>
-        <p:nvSpPr>
-          <p:cNvPr id="382" name="Shape 382"/>
-          <p:cNvSpPr txBox="1">
-            <a:spLocks noGrp="1"/>
-          </p:cNvSpPr>
-          <p:nvPr>
-            <p:ph type="sldNum" idx="12"/>
-          </p:nvPr>
-        </p:nvSpPr>
-        <p:spPr>
-          <a:xfrm>
-            <a:off x="6457950" y="6356351"/>
-            <a:ext cx="2057400" cy="365099"/>
-          </a:xfrm>
-          <a:prstGeom prst="rect">
-            <a:avLst/>
-          </a:prstGeom>
-        </p:spPr>
-        <p:txBody>
-          <a:bodyPr lIns="91425" tIns="45700" rIns="91425" bIns="45700" anchor="ctr" anchorCtr="0">
-            <a:noAutofit/>
-          </a:bodyPr>
-          <a:lstStyle/>
-          <a:p>
-            <a:pPr lvl="0" rtl="0">
-              <a:spcBef>
-                <a:spcPts val="0"/>
-              </a:spcBef>
-              <a:buClr>
-                <a:srgbClr val="000000"/>
-              </a:buClr>
-              <a:buSzPct val="25000"/>
-              <a:buFont typeface="Arial"/>
-              <a:buNone/>
-            </a:pPr>
-            <a:fld id="{00000000-1234-1234-1234-123412341234}" type="slidenum">
-              <a:rPr lang="en-US"/>
-              <a:t>14</a:t>
-            </a:fld>
-            <a:endParaRPr lang="en-US"/>
-          </a:p>
-        </p:txBody>
-      </p:sp>
       <p:sp>
         <p:nvSpPr>
           <p:cNvPr id="383" name="Shape 383"/>
@@ -19371,18 +19290,57 @@
           </a:ln>
         </p:spPr>
       </p:pic>
+      <p:sp>
+        <p:nvSpPr>
+          <p:cNvPr id="6" name="Foliennummernplatzhalter 5"/>
+          <p:cNvSpPr>
+            <a:spLocks noGrp="1"/>
+          </p:cNvSpPr>
+          <p:nvPr>
+            <p:ph type="sldNum" idx="12"/>
+          </p:nvPr>
+        </p:nvSpPr>
+        <p:spPr/>
+        <p:txBody>
+          <a:bodyPr/>
+          <a:lstStyle/>
+          <a:p>
+            <a:pPr marL="0" marR="0" lvl="0" indent="0" algn="r" rtl="0">
+              <a:spcBef>
+                <a:spcPts val="0"/>
+              </a:spcBef>
+              <a:buSzPct val="25000"/>
+              <a:buNone/>
+            </a:pPr>
+            <a:fld id="{00000000-1234-1234-1234-123412341234}" type="slidenum">
+              <a:rPr lang="en-US" sz="1200" smtClean="0">
+                <a:solidFill>
+                  <a:srgbClr val="888888"/>
+                </a:solidFill>
+                <a:latin typeface="Calibri"/>
+                <a:ea typeface="Calibri"/>
+                <a:cs typeface="Calibri"/>
+                <a:sym typeface="Calibri"/>
+              </a:rPr>
+              <a:t>14</a:t>
+            </a:fld>
+            <a:endParaRPr lang="en-US" sz="1200">
+              <a:solidFill>
+                <a:srgbClr val="888888"/>
+              </a:solidFill>
+              <a:latin typeface="Calibri"/>
+              <a:ea typeface="Calibri"/>
+              <a:cs typeface="Calibri"/>
+              <a:sym typeface="Calibri"/>
+            </a:endParaRPr>
+          </a:p>
+        </p:txBody>
+      </p:sp>
     </p:spTree>
   </p:cSld>
   <p:clrMapOvr>
     <a:masterClrMapping/>
   </p:clrMapOvr>
-  <p:timing>
-    <p:tnLst>
-      <p:par>
-        <p:cTn id="1" dur="indefinite" restart="never" nodeType="tmRoot"/>
-      </p:par>
-    </p:tnLst>
-  </p:timing>
 </p:sld>
 </file>
 
@@ -19468,101 +19426,57 @@
           <a:p>
             <a:pPr marL="457200" lvl="0" indent="-228600" rtl="0">
               <a:spcBef>
-                <a:spcPts val="0"/>
+                <a:spcPts val="1200"/>
               </a:spcBef>
             </a:pPr>
             <a:r>
-              <a:rPr lang="en-US"/>
+              <a:rPr lang="en-US" dirty="0"/>
               <a:t>Implemented PF and PPF to reproduce results of paper</a:t>
             </a:r>
           </a:p>
           <a:p>
-            <a:pPr marL="914400" lvl="1" indent="-228600" rtl="0">
-              <a:spcBef>
-                <a:spcPts val="0"/>
+            <a:pPr marL="914400" lvl="1" indent="-228600">
+              <a:spcBef>
+                <a:spcPts val="600"/>
               </a:spcBef>
             </a:pPr>
             <a:r>
-              <a:rPr lang="en-US" i="0"/>
+              <a:rPr lang="en-US" dirty="0"/>
               <a:t>minimized working set and synchronization overhead</a:t>
             </a:r>
           </a:p>
           <a:p>
             <a:pPr marL="457200" lvl="0" indent="-228600" rtl="0">
               <a:spcBef>
-                <a:spcPts val="0"/>
+                <a:spcPts val="1200"/>
               </a:spcBef>
             </a:pPr>
             <a:r>
-              <a:rPr lang="en-US"/>
+              <a:rPr lang="en-US" dirty="0"/>
               <a:t>Bad initial matchings benefit from parallelism</a:t>
             </a:r>
           </a:p>
           <a:p>
             <a:pPr marL="457200" lvl="0" indent="-228600" rtl="0">
               <a:spcBef>
-                <a:spcPts val="0"/>
+                <a:spcPts val="1200"/>
               </a:spcBef>
             </a:pPr>
             <a:r>
-              <a:rPr lang="en-US"/>
+              <a:rPr lang="en-US" dirty="0"/>
               <a:t>Despite the papers claim[1]: PPF scales well on Xeon Phi </a:t>
             </a:r>
           </a:p>
           <a:p>
             <a:pPr marL="457200" lvl="0" indent="-228600" rtl="0">
               <a:spcBef>
-                <a:spcPts val="0"/>
+                <a:spcPts val="1200"/>
               </a:spcBef>
             </a:pPr>
             <a:r>
-              <a:rPr lang="en-US"/>
+              <a:rPr lang="en-US" dirty="0"/>
               <a:t>Could not reproduce results for Tree Grafting</a:t>
             </a:r>
-          </a:p>
-        </p:txBody>
-      </p:sp>
-      <p:sp>
-        <p:nvSpPr>
-          <p:cNvPr id="393" name="Shape 393"/>
-          <p:cNvSpPr txBox="1">
-            <a:spLocks noGrp="1"/>
-          </p:cNvSpPr>
-          <p:nvPr>
-            <p:ph type="sldNum" idx="12"/>
-          </p:nvPr>
-        </p:nvSpPr>
-        <p:spPr>
-          <a:xfrm>
-            <a:off x="6457950" y="6356351"/>
-            <a:ext cx="2057400" cy="365099"/>
-          </a:xfrm>
-          <a:prstGeom prst="rect">
-            <a:avLst/>
-          </a:prstGeom>
-        </p:spPr>
-        <p:txBody>
-          <a:bodyPr lIns="91425" tIns="45700" rIns="91425" bIns="45700" anchor="ctr" anchorCtr="0">
-            <a:noAutofit/>
-          </a:bodyPr>
-          <a:lstStyle/>
-          <a:p>
-            <a:pPr lvl="0" rtl="0">
-              <a:spcBef>
-                <a:spcPts val="0"/>
-              </a:spcBef>
-              <a:buClr>
-                <a:srgbClr val="000000"/>
-              </a:buClr>
-              <a:buSzPct val="25000"/>
-              <a:buFont typeface="Arial"/>
-              <a:buNone/>
-            </a:pPr>
-            <a:fld id="{00000000-1234-1234-1234-123412341234}" type="slidenum">
-              <a:rPr lang="en-US"/>
-              <a:t>15</a:t>
-            </a:fld>
-            <a:endParaRPr lang="en-US"/>
           </a:p>
         </p:txBody>
       </p:sp>
@@ -19574,7 +19488,7 @@
         </p:nvSpPr>
         <p:spPr>
           <a:xfrm>
-            <a:off x="229800" y="6356350"/>
+            <a:off x="106158" y="6356291"/>
             <a:ext cx="8684400" cy="365100"/>
           </a:xfrm>
           <a:prstGeom prst="rect">
@@ -19598,13 +19512,59 @@
               <a:buNone/>
             </a:pPr>
             <a:r>
-              <a:rPr lang="en-US">
+              <a:rPr lang="en-US" dirty="0">
                 <a:solidFill>
                   <a:srgbClr val="666666"/>
                 </a:solidFill>
               </a:rPr>
               <a:t>[1] Azad et al: A parallel tree grafting algorithm for maximum cardinality matching in bipartite graphs.</a:t>
             </a:r>
+          </a:p>
+        </p:txBody>
+      </p:sp>
+      <p:sp>
+        <p:nvSpPr>
+          <p:cNvPr id="6" name="Foliennummernplatzhalter 5"/>
+          <p:cNvSpPr>
+            <a:spLocks noGrp="1"/>
+          </p:cNvSpPr>
+          <p:nvPr>
+            <p:ph type="sldNum" idx="12"/>
+          </p:nvPr>
+        </p:nvSpPr>
+        <p:spPr/>
+        <p:txBody>
+          <a:bodyPr/>
+          <a:lstStyle/>
+          <a:p>
+            <a:pPr marL="0" marR="0" lvl="0" indent="0" algn="r" rtl="0">
+              <a:spcBef>
+                <a:spcPts val="0"/>
+              </a:spcBef>
+              <a:buSzPct val="25000"/>
+              <a:buNone/>
+            </a:pPr>
+            <a:fld id="{00000000-1234-1234-1234-123412341234}" type="slidenum">
+              <a:rPr lang="en-US" sz="1200" b="0" i="0" u="none" strike="noStrike" cap="none" smtClean="0">
+                <a:solidFill>
+                  <a:srgbClr val="888888"/>
+                </a:solidFill>
+                <a:latin typeface="Calibri"/>
+                <a:ea typeface="Calibri"/>
+                <a:cs typeface="Calibri"/>
+                <a:sym typeface="Calibri"/>
+              </a:rPr>
+              <a:t>15</a:t>
+            </a:fld>
+            <a:endParaRPr lang="en-US" sz="1200" b="0" i="0" u="none" strike="noStrike" cap="none">
+              <a:solidFill>
+                <a:srgbClr val="888888"/>
+              </a:solidFill>
+              <a:latin typeface="Calibri"/>
+              <a:ea typeface="Calibri"/>
+              <a:cs typeface="Calibri"/>
+              <a:sym typeface="Calibri"/>
+            </a:endParaRPr>
           </a:p>
         </p:txBody>
       </p:sp>
@@ -19613,13 +19573,6 @@
   <p:clrMapOvr>
     <a:masterClrMapping/>
   </p:clrMapOvr>
-  <p:timing>
-    <p:tnLst>
-      <p:par>
-        <p:cTn id="1" dur="indefinite" restart="never" nodeType="tmRoot"/>
-      </p:par>
-    </p:tnLst>
-  </p:timing>
 </p:sld>
 </file>
 
@@ -19702,54 +19655,6 @@
           </a:p>
         </p:txBody>
       </p:sp>
-      <p:sp>
-        <p:nvSpPr>
-          <p:cNvPr id="149" name="Shape 149"/>
-          <p:cNvSpPr txBox="1">
-            <a:spLocks noGrp="1"/>
-          </p:cNvSpPr>
-          <p:nvPr>
-            <p:ph type="sldNum" idx="12"/>
-          </p:nvPr>
-        </p:nvSpPr>
-        <p:spPr>
-          <a:xfrm>
-            <a:off x="6457950" y="6356351"/>
-            <a:ext cx="2057400" cy="365099"/>
-          </a:xfrm>
-          <a:prstGeom prst="rect">
-            <a:avLst/>
-          </a:prstGeom>
-          <a:noFill/>
-          <a:ln>
-            <a:noFill/>
-          </a:ln>
-        </p:spPr>
-        <p:txBody>
-          <a:bodyPr lIns="91425" tIns="45700" rIns="91425" bIns="45700" anchor="ctr" anchorCtr="0">
-            <a:noAutofit/>
-          </a:bodyPr>
-          <a:lstStyle/>
-          <a:p>
-            <a:pPr lvl="0" rtl="0">
-              <a:spcBef>
-                <a:spcPts val="0"/>
-              </a:spcBef>
-              <a:buClr>
-                <a:srgbClr val="000000"/>
-              </a:buClr>
-              <a:buSzPct val="25000"/>
-              <a:buFont typeface="Arial"/>
-              <a:buNone/>
-            </a:pPr>
-            <a:fld id="{00000000-1234-1234-1234-123412341234}" type="slidenum">
-              <a:rPr lang="en-US"/>
-              <a:t>2</a:t>
-            </a:fld>
-            <a:endParaRPr lang="en-US"/>
-          </a:p>
-        </p:txBody>
-      </p:sp>
       <p:pic>
         <p:nvPicPr>
           <p:cNvPr id="150" name="Shape 150"/>
@@ -19786,8 +19691,8 @@
         </p:nvSpPr>
         <p:spPr>
           <a:xfrm>
-            <a:off x="202200" y="6411275"/>
-            <a:ext cx="6412800" cy="748200"/>
+            <a:off x="156146" y="6356350"/>
+            <a:ext cx="7130755" cy="365125"/>
           </a:xfrm>
           <a:prstGeom prst="rect">
             <a:avLst/>
@@ -19810,9 +19715,60 @@
               <a:buNone/>
             </a:pPr>
             <a:r>
-              <a:rPr lang="en-US"/>
-              <a:t>http://lemon.cs.elte.hu/pub/doc/latest-svn/bipartite_matching.png</a:t>
+              <a:rPr lang="en-US" dirty="0">
+                <a:solidFill>
+                  <a:schemeClr val="tx2">
+                    <a:lumMod val="50000"/>
+                  </a:schemeClr>
+                </a:solidFill>
+              </a:rPr>
+              <a:t>Image source: http://lemon.cs.elte.hu/pub/doc/latest-svn/bipartite_matching.png</a:t>
             </a:r>
+          </a:p>
+        </p:txBody>
+      </p:sp>
+      <p:sp>
+        <p:nvSpPr>
+          <p:cNvPr id="6" name="Foliennummernplatzhalter 5"/>
+          <p:cNvSpPr>
+            <a:spLocks noGrp="1"/>
+          </p:cNvSpPr>
+          <p:nvPr>
+            <p:ph type="sldNum" idx="12"/>
+          </p:nvPr>
+        </p:nvSpPr>
+        <p:spPr/>
+        <p:txBody>
+          <a:bodyPr/>
+          <a:lstStyle/>
+          <a:p>
+            <a:pPr algn="r">
+              <a:buSzPct val="25000"/>
+            </a:pPr>
+            <a:fld id="{00000000-1234-1234-1234-123412341234}" type="slidenum">
+              <a:rPr lang="en-US" smtClean="0">
+                <a:solidFill>
+                  <a:srgbClr val="888888"/>
+                </a:solidFill>
+                <a:latin typeface="Calibri"/>
+                <a:ea typeface="Calibri"/>
+                <a:cs typeface="Calibri"/>
+                <a:sym typeface="Calibri"/>
+              </a:rPr>
+              <a:pPr algn="r">
+                <a:buSzPct val="25000"/>
+              </a:pPr>
+              <a:t>2</a:t>
+            </a:fld>
+            <a:endParaRPr lang="en-US" dirty="0">
+              <a:solidFill>
+                <a:srgbClr val="888888"/>
+              </a:solidFill>
+              <a:latin typeface="Calibri"/>
+              <a:ea typeface="Calibri"/>
+              <a:cs typeface="Calibri"/>
+              <a:sym typeface="Calibri"/>
+            </a:endParaRPr>
           </a:p>
         </p:txBody>
       </p:sp>
@@ -19821,13 +19777,6 @@
   <p:clrMapOvr>
     <a:masterClrMapping/>
   </p:clrMapOvr>
-  <p:timing>
-    <p:tnLst>
-      <p:par>
-        <p:cTn id="1" dur="indefinite" restart="never" nodeType="tmRoot"/>
-      </p:par>
-    </p:tnLst>
-  </p:timing>
 </p:sld>
 </file>
 
@@ -19915,31 +19864,52 @@
               <a:spcBef>
                 <a:spcPts val="0"/>
               </a:spcBef>
+              <a:spcAft>
+                <a:spcPts val="600"/>
+              </a:spcAft>
               <a:buNone/>
             </a:pPr>
             <a:r>
-              <a:rPr lang="en-US" sz="2200">
-                <a:latin typeface="Arial"/>
+              <a:rPr lang="en-US" sz="2400" dirty="0">
+                <a:latin typeface="Calibri" panose="020F0502020204030204" pitchFamily="34" charset="0"/>
                 <a:ea typeface="Arial"/>
-                <a:cs typeface="Arial"/>
+                <a:cs typeface="Calibri" panose="020F0502020204030204" pitchFamily="34" charset="0"/>
                 <a:sym typeface="Arial"/>
               </a:rPr>
-              <a:t>Azad Ariful, et al. Multithreaded algorithms for maximum matching in bipartite graphs. </a:t>
+              <a:t>Azad </a:t>
             </a:r>
             <a:r>
-              <a:rPr lang="en-US" sz="2200" i="1">
-                <a:latin typeface="Arial"/>
+              <a:rPr lang="en-US" sz="2400" dirty="0" err="1">
+                <a:latin typeface="Calibri" panose="020F0502020204030204" pitchFamily="34" charset="0"/>
                 <a:ea typeface="Arial"/>
-                <a:cs typeface="Arial"/>
+                <a:cs typeface="Calibri" panose="020F0502020204030204" pitchFamily="34" charset="0"/>
+                <a:sym typeface="Arial"/>
+              </a:rPr>
+              <a:t>Ariful</a:t>
+            </a:r>
+            <a:r>
+              <a:rPr lang="en-US" sz="2400" dirty="0">
+                <a:latin typeface="Calibri" panose="020F0502020204030204" pitchFamily="34" charset="0"/>
+                <a:ea typeface="Arial"/>
+                <a:cs typeface="Calibri" panose="020F0502020204030204" pitchFamily="34" charset="0"/>
+                <a:sym typeface="Arial"/>
+              </a:rPr>
+              <a:t>, et al. Multithreaded algorithms for maximum matching in bipartite graphs. </a:t>
+            </a:r>
+            <a:r>
+              <a:rPr lang="en-US" sz="2400" i="1" dirty="0">
+                <a:latin typeface="Calibri" panose="020F0502020204030204" pitchFamily="34" charset="0"/>
+                <a:ea typeface="Arial"/>
+                <a:cs typeface="Calibri" panose="020F0502020204030204" pitchFamily="34" charset="0"/>
                 <a:sym typeface="Arial"/>
               </a:rPr>
               <a:t>Parallel &amp; Distributed Processing Symposium (IPDPS), 2012 IEEE 26th International</a:t>
             </a:r>
             <a:r>
-              <a:rPr lang="en-US" sz="2200">
-                <a:latin typeface="Arial"/>
+              <a:rPr lang="en-US" sz="2400" dirty="0">
+                <a:latin typeface="Calibri" panose="020F0502020204030204" pitchFamily="34" charset="0"/>
                 <a:ea typeface="Arial"/>
-                <a:cs typeface="Arial"/>
+                <a:cs typeface="Calibri" panose="020F0502020204030204" pitchFamily="34" charset="0"/>
                 <a:sym typeface="Arial"/>
               </a:rPr>
               <a:t>. IEEE, 2012.</a:t>
@@ -19954,35 +19924,53 @@
               <a:buFont typeface="Arial"/>
             </a:pPr>
             <a:r>
-              <a:rPr lang="en-US" sz="2200" b="1">
-                <a:latin typeface="Arial"/>
+              <a:rPr lang="en-US" sz="2000" b="1" dirty="0">
+                <a:latin typeface="Calibri" panose="020F0502020204030204" pitchFamily="34" charset="0"/>
                 <a:ea typeface="Arial"/>
-                <a:cs typeface="Arial"/>
+                <a:cs typeface="Calibri" panose="020F0502020204030204" pitchFamily="34" charset="0"/>
                 <a:sym typeface="Arial"/>
               </a:rPr>
-              <a:t>Parallel Pothen Fan</a:t>
+              <a:t>Parallel </a:t>
             </a:r>
             <a:r>
-              <a:rPr lang="en-US" sz="2200">
-                <a:latin typeface="Arial"/>
+              <a:rPr lang="en-US" sz="2000" b="1" dirty="0" err="1">
+                <a:latin typeface="Calibri" panose="020F0502020204030204" pitchFamily="34" charset="0"/>
                 <a:ea typeface="Arial"/>
-                <a:cs typeface="Arial"/>
+                <a:cs typeface="Calibri" panose="020F0502020204030204" pitchFamily="34" charset="0"/>
+                <a:sym typeface="Arial"/>
+              </a:rPr>
+              <a:t>Pothen</a:t>
+            </a:r>
+            <a:r>
+              <a:rPr lang="en-US" sz="2000" b="1" dirty="0">
+                <a:latin typeface="Calibri" panose="020F0502020204030204" pitchFamily="34" charset="0"/>
+                <a:ea typeface="Arial"/>
+                <a:cs typeface="Calibri" panose="020F0502020204030204" pitchFamily="34" charset="0"/>
+                <a:sym typeface="Arial"/>
+              </a:rPr>
+              <a:t> Fan</a:t>
+            </a:r>
+            <a:r>
+              <a:rPr lang="en-US" sz="2000" dirty="0">
+                <a:latin typeface="Calibri" panose="020F0502020204030204" pitchFamily="34" charset="0"/>
+                <a:ea typeface="Arial"/>
+                <a:cs typeface="Calibri" panose="020F0502020204030204" pitchFamily="34" charset="0"/>
                 <a:sym typeface="Arial"/>
               </a:rPr>
               <a:t> (PPF)</a:t>
             </a:r>
             <a:br>
-              <a:rPr lang="en-US" sz="2200">
-                <a:latin typeface="Arial"/>
+              <a:rPr lang="en-US" sz="2200" dirty="0">
+                <a:latin typeface="Calibri" panose="020F0502020204030204" pitchFamily="34" charset="0"/>
                 <a:ea typeface="Arial"/>
-                <a:cs typeface="Arial"/>
+                <a:cs typeface="Calibri" panose="020F0502020204030204" pitchFamily="34" charset="0"/>
                 <a:sym typeface="Arial"/>
               </a:rPr>
             </a:br>
-            <a:endParaRPr lang="en-US" sz="2200">
-              <a:latin typeface="Arial"/>
+            <a:endParaRPr lang="en-US" sz="2200" dirty="0">
+              <a:latin typeface="Calibri" panose="020F0502020204030204" pitchFamily="34" charset="0"/>
               <a:ea typeface="Arial"/>
-              <a:cs typeface="Arial"/>
+              <a:cs typeface="Calibri" panose="020F0502020204030204" pitchFamily="34" charset="0"/>
               <a:sym typeface="Arial"/>
             </a:endParaRPr>
           </a:p>
@@ -19991,31 +19979,88 @@
               <a:spcBef>
                 <a:spcPts val="0"/>
               </a:spcBef>
+              <a:spcAft>
+                <a:spcPts val="600"/>
+              </a:spcAft>
               <a:buNone/>
             </a:pPr>
             <a:r>
-              <a:rPr lang="en-US" sz="2200">
-                <a:latin typeface="Arial"/>
+              <a:rPr lang="en-US" sz="2400" dirty="0">
+                <a:latin typeface="Calibri" panose="020F0502020204030204" pitchFamily="34" charset="0"/>
                 <a:ea typeface="Arial"/>
-                <a:cs typeface="Arial"/>
+                <a:cs typeface="Calibri" panose="020F0502020204030204" pitchFamily="34" charset="0"/>
                 <a:sym typeface="Arial"/>
               </a:rPr>
-              <a:t>Azad Ariful, Aydin Buluç, and Alex Pothen. A parallel tree grafting algorithm for maximum cardinality matching in bipartite graphs. </a:t>
+              <a:t>Azad </a:t>
             </a:r>
             <a:r>
-              <a:rPr lang="en-US" sz="2200" i="1">
-                <a:latin typeface="Arial"/>
+              <a:rPr lang="en-US" sz="2400" dirty="0" err="1">
+                <a:latin typeface="Calibri" panose="020F0502020204030204" pitchFamily="34" charset="0"/>
                 <a:ea typeface="Arial"/>
-                <a:cs typeface="Arial"/>
+                <a:cs typeface="Calibri" panose="020F0502020204030204" pitchFamily="34" charset="0"/>
+                <a:sym typeface="Arial"/>
+              </a:rPr>
+              <a:t>Ariful</a:t>
+            </a:r>
+            <a:r>
+              <a:rPr lang="en-US" sz="2400" dirty="0">
+                <a:latin typeface="Calibri" panose="020F0502020204030204" pitchFamily="34" charset="0"/>
+                <a:ea typeface="Arial"/>
+                <a:cs typeface="Calibri" panose="020F0502020204030204" pitchFamily="34" charset="0"/>
+                <a:sym typeface="Arial"/>
+              </a:rPr>
+              <a:t>, Aydin </a:t>
+            </a:r>
+            <a:r>
+              <a:rPr lang="en-US" sz="2400" dirty="0" err="1">
+                <a:latin typeface="Calibri" panose="020F0502020204030204" pitchFamily="34" charset="0"/>
+                <a:ea typeface="Arial"/>
+                <a:cs typeface="Calibri" panose="020F0502020204030204" pitchFamily="34" charset="0"/>
+                <a:sym typeface="Arial"/>
+              </a:rPr>
+              <a:t>Buluç</a:t>
+            </a:r>
+            <a:r>
+              <a:rPr lang="en-US" sz="2400" dirty="0">
+                <a:latin typeface="Calibri" panose="020F0502020204030204" pitchFamily="34" charset="0"/>
+                <a:ea typeface="Arial"/>
+                <a:cs typeface="Calibri" panose="020F0502020204030204" pitchFamily="34" charset="0"/>
+                <a:sym typeface="Arial"/>
+              </a:rPr>
+              <a:t>, and Alex </a:t>
+            </a:r>
+            <a:r>
+              <a:rPr lang="en-US" sz="2400" dirty="0" err="1">
+                <a:latin typeface="Calibri" panose="020F0502020204030204" pitchFamily="34" charset="0"/>
+                <a:ea typeface="Arial"/>
+                <a:cs typeface="Calibri" panose="020F0502020204030204" pitchFamily="34" charset="0"/>
+                <a:sym typeface="Arial"/>
+              </a:rPr>
+              <a:t>Pothen</a:t>
+            </a:r>
+            <a:r>
+              <a:rPr lang="en-US" sz="2400" dirty="0">
+                <a:latin typeface="Calibri" panose="020F0502020204030204" pitchFamily="34" charset="0"/>
+                <a:ea typeface="Arial"/>
+                <a:cs typeface="Calibri" panose="020F0502020204030204" pitchFamily="34" charset="0"/>
+                <a:sym typeface="Arial"/>
+              </a:rPr>
+              <a:t>. A parallel tree grafting algorithm for maximum cardinality matching in bipartite graphs. </a:t>
+            </a:r>
+            <a:r>
+              <a:rPr lang="en-US" sz="2400" i="1" dirty="0">
+                <a:latin typeface="Calibri" panose="020F0502020204030204" pitchFamily="34" charset="0"/>
+                <a:ea typeface="Arial"/>
+                <a:cs typeface="Calibri" panose="020F0502020204030204" pitchFamily="34" charset="0"/>
                 <a:sym typeface="Arial"/>
               </a:rPr>
               <a:t>Parallel and Distributed Processing Symposium (IPDPS), 2015 IEEE International</a:t>
             </a:r>
             <a:r>
-              <a:rPr lang="en-US" sz="2200">
-                <a:latin typeface="Arial"/>
+              <a:rPr lang="en-US" sz="2400" dirty="0">
+                <a:latin typeface="Calibri" panose="020F0502020204030204" pitchFamily="34" charset="0"/>
                 <a:ea typeface="Arial"/>
-                <a:cs typeface="Arial"/>
+                <a:cs typeface="Calibri" panose="020F0502020204030204" pitchFamily="34" charset="0"/>
                 <a:sym typeface="Arial"/>
               </a:rPr>
               <a:t>. IEEE, 2015.</a:t>
@@ -20026,23 +20071,26 @@
               <a:spcBef>
                 <a:spcPts val="0"/>
               </a:spcBef>
+              <a:spcAft>
+                <a:spcPts val="600"/>
+              </a:spcAft>
               <a:buSzPct val="100000"/>
               <a:buFont typeface="Arial"/>
             </a:pPr>
             <a:r>
-              <a:rPr lang="en-US" sz="2200" b="1">
-                <a:latin typeface="Arial"/>
+              <a:rPr lang="en-US" sz="2000" b="1" dirty="0">
+                <a:latin typeface="Calibri" panose="020F0502020204030204" pitchFamily="34" charset="0"/>
                 <a:ea typeface="Arial"/>
-                <a:cs typeface="Arial"/>
+                <a:cs typeface="Calibri" panose="020F0502020204030204" pitchFamily="34" charset="0"/>
                 <a:sym typeface="Arial"/>
               </a:rPr>
               <a:t>Tree Grafting Algorithm</a:t>
             </a:r>
             <a:r>
-              <a:rPr lang="en-US" sz="2200">
-                <a:latin typeface="Arial"/>
+              <a:rPr lang="en-US" sz="2000" dirty="0">
+                <a:latin typeface="Calibri" panose="020F0502020204030204" pitchFamily="34" charset="0"/>
                 <a:ea typeface="Arial"/>
-                <a:cs typeface="Arial"/>
+                <a:cs typeface="Calibri" panose="020F0502020204030204" pitchFamily="34" charset="0"/>
                 <a:sym typeface="Arial"/>
               </a:rPr>
               <a:t> (TG)</a:t>
@@ -20053,80 +20101,76 @@
               <a:spcBef>
                 <a:spcPts val="0"/>
               </a:spcBef>
+              <a:spcAft>
+                <a:spcPts val="600"/>
+              </a:spcAft>
               <a:buSzPct val="100000"/>
               <a:buFont typeface="Arial"/>
             </a:pPr>
             <a:r>
-              <a:rPr lang="en-US" sz="2200">
-                <a:latin typeface="Arial"/>
+              <a:rPr lang="en-US" sz="2000" dirty="0">
+                <a:latin typeface="Calibri" panose="020F0502020204030204" pitchFamily="34" charset="0"/>
                 <a:ea typeface="Arial"/>
-                <a:cs typeface="Arial"/>
+                <a:cs typeface="Calibri" panose="020F0502020204030204" pitchFamily="34" charset="0"/>
                 <a:sym typeface="Arial"/>
               </a:rPr>
               <a:t>Claim: </a:t>
             </a:r>
             <a:r>
-              <a:rPr lang="en-US" sz="2200" b="1">
-                <a:latin typeface="Arial"/>
+              <a:rPr lang="en-US" sz="2000" b="1" dirty="0">
+                <a:latin typeface="Calibri" panose="020F0502020204030204" pitchFamily="34" charset="0"/>
                 <a:ea typeface="Arial"/>
-                <a:cs typeface="Arial"/>
+                <a:cs typeface="Calibri" panose="020F0502020204030204" pitchFamily="34" charset="0"/>
                 <a:sym typeface="Arial"/>
               </a:rPr>
               <a:t>PPF not suitable for many thin cores</a:t>
             </a:r>
           </a:p>
-          <a:p>
-            <a:pPr lvl="0">
-              <a:spcBef>
-                <a:spcPts val="0"/>
-              </a:spcBef>
-              <a:buNone/>
-            </a:pPr>
-            <a:endParaRPr/>
-          </a:p>
         </p:txBody>
       </p:sp>
       <p:sp>
         <p:nvSpPr>
-          <p:cNvPr id="159" name="Shape 159"/>
-          <p:cNvSpPr txBox="1">
+          <p:cNvPr id="6" name="Foliennummernplatzhalter 5"/>
+          <p:cNvSpPr>
             <a:spLocks noGrp="1"/>
           </p:cNvSpPr>
           <p:nvPr>
             <p:ph type="sldNum" idx="12"/>
           </p:nvPr>
         </p:nvSpPr>
-        <p:spPr>
-          <a:xfrm>
-            <a:off x="6457950" y="6356351"/>
-            <a:ext cx="2057400" cy="365099"/>
-          </a:xfrm>
-          <a:prstGeom prst="rect">
-            <a:avLst/>
-          </a:prstGeom>
-        </p:spPr>
+        <p:spPr/>
         <p:txBody>
-          <a:bodyPr lIns="91425" tIns="45700" rIns="91425" bIns="45700" anchor="ctr" anchorCtr="0">
-            <a:noAutofit/>
-          </a:bodyPr>
+          <a:bodyPr/>
           <a:lstStyle/>
           <a:p>
-            <a:pPr lvl="0">
-              <a:spcBef>
-                <a:spcPts val="0"/>
-              </a:spcBef>
-              <a:buClr>
-                <a:srgbClr val="000000"/>
-              </a:buClr>
+            <a:pPr marL="0" marR="0" lvl="0" indent="0" algn="r" rtl="0">
+              <a:spcBef>
+                <a:spcPts val="0"/>
+              </a:spcBef>
               <a:buSzPct val="25000"/>
-              <a:buFont typeface="Arial"/>
               <a:buNone/>
             </a:pPr>
             <a:fld id="{00000000-1234-1234-1234-123412341234}" type="slidenum">
-              <a:rPr lang="en-US"/>
+              <a:rPr lang="en-US" sz="1200" b="0" i="0" u="none" strike="noStrike" cap="none" smtClean="0">
+                <a:solidFill>
+                  <a:srgbClr val="888888"/>
+                </a:solidFill>
+                <a:latin typeface="Calibri"/>
+                <a:ea typeface="Calibri"/>
+                <a:cs typeface="Calibri"/>
+                <a:sym typeface="Calibri"/>
+              </a:rPr>
               <a:t>3</a:t>
             </a:fld>
-            <a:endParaRPr lang="en-US"/>
+            <a:endParaRPr lang="en-US" sz="1200" b="0" i="0" u="none" strike="noStrike" cap="none">
+              <a:solidFill>
+                <a:srgbClr val="888888"/>
+              </a:solidFill>
+              <a:latin typeface="Calibri"/>
+              <a:ea typeface="Calibri"/>
+              <a:cs typeface="Calibri"/>
+              <a:sym typeface="Calibri"/>
+            </a:endParaRPr>
           </a:p>
         </p:txBody>
       </p:sp>
@@ -20135,13 +20179,6 @@
   <p:clrMapOvr>
     <a:masterClrMapping/>
   </p:clrMapOvr>
-  <p:timing>
-    <p:tnLst>
-      <p:par>
-        <p:cTn id="1" dur="indefinite" restart="never" nodeType="tmRoot"/>
-      </p:par>
-    </p:tnLst>
-  </p:timing>
 </p:sld>
 </file>
 
@@ -20212,8 +20249,8 @@
         </p:nvSpPr>
         <p:spPr>
           <a:xfrm>
-            <a:off x="628650" y="1825625"/>
-            <a:ext cx="7886700" cy="4351200"/>
+            <a:off x="628649" y="1825625"/>
+            <a:ext cx="7822893" cy="4351200"/>
           </a:xfrm>
           <a:prstGeom prst="rect">
             <a:avLst/>
@@ -20229,9 +20266,12 @@
               <a:spcBef>
                 <a:spcPts val="0"/>
               </a:spcBef>
+              <a:spcAft>
+                <a:spcPts val="1200"/>
+              </a:spcAft>
             </a:pPr>
             <a:r>
-              <a:rPr lang="en-US"/>
+              <a:rPr lang="en-US" dirty="0"/>
               <a:t>Implemented PF and PPF to reproduce results of paper</a:t>
             </a:r>
           </a:p>
@@ -20240,10 +20280,17 @@
               <a:spcBef>
                 <a:spcPts val="0"/>
               </a:spcBef>
+              <a:spcAft>
+                <a:spcPts val="1200"/>
+              </a:spcAft>
             </a:pPr>
             <a:r>
-              <a:rPr lang="en-US"/>
-              <a:t>Analysed performance of PPF on Xeon Phi</a:t>
+              <a:rPr lang="en-US" dirty="0" err="1"/>
+              <a:t>Analysed</a:t>
+            </a:r>
+            <a:r>
+              <a:rPr lang="en-US" dirty="0"/>
+              <a:t> performance of PPF on Xeon Phi</a:t>
             </a:r>
           </a:p>
           <a:p>
@@ -20251,9 +20298,12 @@
               <a:spcBef>
                 <a:spcPts val="0"/>
               </a:spcBef>
+              <a:spcAft>
+                <a:spcPts val="1200"/>
+              </a:spcAft>
             </a:pPr>
             <a:r>
-              <a:rPr lang="en-US"/>
+              <a:rPr lang="en-US" dirty="0"/>
               <a:t>Basic parallel tree grafting implementation</a:t>
             </a:r>
           </a:p>
@@ -20261,45 +20311,47 @@
       </p:sp>
       <p:sp>
         <p:nvSpPr>
-          <p:cNvPr id="167" name="Shape 167"/>
-          <p:cNvSpPr txBox="1">
+          <p:cNvPr id="5" name="Foliennummernplatzhalter 4"/>
+          <p:cNvSpPr>
             <a:spLocks noGrp="1"/>
           </p:cNvSpPr>
           <p:nvPr>
             <p:ph type="sldNum" idx="12"/>
           </p:nvPr>
         </p:nvSpPr>
-        <p:spPr>
-          <a:xfrm>
-            <a:off x="6457950" y="6356351"/>
-            <a:ext cx="2057400" cy="365099"/>
-          </a:xfrm>
-          <a:prstGeom prst="rect">
-            <a:avLst/>
-          </a:prstGeom>
-        </p:spPr>
+        <p:spPr/>
         <p:txBody>
-          <a:bodyPr lIns="91425" tIns="45700" rIns="91425" bIns="45700" anchor="ctr" anchorCtr="0">
-            <a:noAutofit/>
-          </a:bodyPr>
+          <a:bodyPr/>
           <a:lstStyle/>
           <a:p>
-            <a:pPr lvl="0">
-              <a:spcBef>
-                <a:spcPts val="0"/>
-              </a:spcBef>
-              <a:buClr>
-                <a:srgbClr val="000000"/>
-              </a:buClr>
+            <a:pPr marL="0" marR="0" lvl="0" indent="0" algn="r" rtl="0">
+              <a:spcBef>
+                <a:spcPts val="0"/>
+              </a:spcBef>
               <a:buSzPct val="25000"/>
-              <a:buFont typeface="Arial"/>
               <a:buNone/>
             </a:pPr>
             <a:fld id="{00000000-1234-1234-1234-123412341234}" type="slidenum">
-              <a:rPr lang="en-US"/>
+              <a:rPr lang="en-US" sz="1200" b="0" i="0" u="none" strike="noStrike" cap="none" smtClean="0">
+                <a:solidFill>
+                  <a:srgbClr val="888888"/>
+                </a:solidFill>
+                <a:latin typeface="Calibri"/>
+                <a:ea typeface="Calibri"/>
+                <a:cs typeface="Calibri"/>
+                <a:sym typeface="Calibri"/>
+              </a:rPr>
               <a:t>4</a:t>
             </a:fld>
-            <a:endParaRPr lang="en-US"/>
+            <a:endParaRPr lang="en-US" sz="1200" b="0" i="0" u="none" strike="noStrike" cap="none">
+              <a:solidFill>
+                <a:srgbClr val="888888"/>
+              </a:solidFill>
+              <a:latin typeface="Calibri"/>
+              <a:ea typeface="Calibri"/>
+              <a:cs typeface="Calibri"/>
+              <a:sym typeface="Calibri"/>
+            </a:endParaRPr>
           </a:p>
         </p:txBody>
       </p:sp>
@@ -20308,13 +20360,6 @@
   <p:clrMapOvr>
     <a:masterClrMapping/>
   </p:clrMapOvr>
-  <p:timing>
-    <p:tnLst>
-      <p:par>
-        <p:cTn id="1" dur="indefinite" restart="never" nodeType="tmRoot"/>
-      </p:par>
-    </p:tnLst>
-  </p:timing>
 </p:sld>
 </file>
 
@@ -20375,50 +20420,6 @@
       </p:sp>
       <p:sp>
         <p:nvSpPr>
-          <p:cNvPr id="174" name="Shape 174"/>
-          <p:cNvSpPr txBox="1">
-            <a:spLocks noGrp="1"/>
-          </p:cNvSpPr>
-          <p:nvPr>
-            <p:ph type="sldNum" idx="12"/>
-          </p:nvPr>
-        </p:nvSpPr>
-        <p:spPr>
-          <a:xfrm>
-            <a:off x="6457950" y="6356351"/>
-            <a:ext cx="2057400" cy="365099"/>
-          </a:xfrm>
-          <a:prstGeom prst="rect">
-            <a:avLst/>
-          </a:prstGeom>
-        </p:spPr>
-        <p:txBody>
-          <a:bodyPr lIns="91425" tIns="45700" rIns="91425" bIns="45700" anchor="ctr" anchorCtr="0">
-            <a:noAutofit/>
-          </a:bodyPr>
-          <a:lstStyle/>
-          <a:p>
-            <a:pPr lvl="0">
-              <a:spcBef>
-                <a:spcPts val="0"/>
-              </a:spcBef>
-              <a:buClr>
-                <a:srgbClr val="000000"/>
-              </a:buClr>
-              <a:buSzPct val="25000"/>
-              <a:buFont typeface="Arial"/>
-              <a:buNone/>
-            </a:pPr>
-            <a:fld id="{00000000-1234-1234-1234-123412341234}" type="slidenum">
-              <a:rPr lang="en-US"/>
-              <a:t>5</a:t>
-            </a:fld>
-            <a:endParaRPr lang="en-US"/>
-          </a:p>
-        </p:txBody>
-      </p:sp>
-      <p:sp>
-        <p:nvSpPr>
           <p:cNvPr id="175" name="Shape 175"/>
           <p:cNvSpPr txBox="1">
             <a:spLocks noGrp="1"/>
@@ -20446,9 +20447,12 @@
               <a:spcBef>
                 <a:spcPts val="0"/>
               </a:spcBef>
+              <a:spcAft>
+                <a:spcPts val="1200"/>
+              </a:spcAft>
             </a:pPr>
             <a:r>
-              <a:rPr lang="en-US"/>
+              <a:rPr lang="en-US" dirty="0"/>
               <a:t>Start with initial matching</a:t>
             </a:r>
           </a:p>
@@ -20457,9 +20461,12 @@
               <a:spcBef>
                 <a:spcPts val="0"/>
               </a:spcBef>
+              <a:spcAft>
+                <a:spcPts val="1200"/>
+              </a:spcAft>
             </a:pPr>
             <a:r>
-              <a:rPr lang="en-US"/>
+              <a:rPr lang="en-US" dirty="0"/>
               <a:t>Find augmenting paths</a:t>
             </a:r>
           </a:p>
@@ -20468,9 +20475,12 @@
               <a:spcBef>
                 <a:spcPts val="0"/>
               </a:spcBef>
+              <a:spcAft>
+                <a:spcPts val="1200"/>
+              </a:spcAft>
             </a:pPr>
             <a:r>
-              <a:rPr lang="en-US"/>
+              <a:rPr lang="en-US" dirty="0"/>
               <a:t>DFS from each unmatched node</a:t>
             </a:r>
           </a:p>
@@ -20479,9 +20489,12 @@
               <a:spcBef>
                 <a:spcPts val="0"/>
               </a:spcBef>
+              <a:spcAft>
+                <a:spcPts val="1200"/>
+              </a:spcAft>
             </a:pPr>
             <a:r>
-              <a:rPr lang="en-US"/>
+              <a:rPr lang="en-US" dirty="0"/>
               <a:t>Stack based DFS implementation</a:t>
             </a:r>
           </a:p>
@@ -20490,9 +20503,12 @@
               <a:spcBef>
                 <a:spcPts val="0"/>
               </a:spcBef>
+              <a:spcAft>
+                <a:spcPts val="1200"/>
+              </a:spcAft>
             </a:pPr>
             <a:r>
-              <a:rPr lang="en-US"/>
+              <a:rPr lang="en-US" dirty="0"/>
               <a:t>O(m*n)</a:t>
             </a:r>
           </a:p>
@@ -21422,6 +21438,51 @@
           </p:txBody>
         </p:sp>
       </p:grpSp>
+      <p:sp>
+        <p:nvSpPr>
+          <p:cNvPr id="6" name="Foliennummernplatzhalter 5"/>
+          <p:cNvSpPr>
+            <a:spLocks noGrp="1"/>
+          </p:cNvSpPr>
+          <p:nvPr>
+            <p:ph type="sldNum" idx="12"/>
+          </p:nvPr>
+        </p:nvSpPr>
+        <p:spPr/>
+        <p:txBody>
+          <a:bodyPr/>
+          <a:lstStyle/>
+          <a:p>
+            <a:pPr algn="r">
+              <a:buSzPct val="25000"/>
+            </a:pPr>
+            <a:fld id="{00000000-1234-1234-1234-123412341234}" type="slidenum">
+              <a:rPr lang="en-US" smtClean="0">
+                <a:solidFill>
+                  <a:srgbClr val="888888"/>
+                </a:solidFill>
+                <a:latin typeface="Calibri"/>
+                <a:ea typeface="Calibri"/>
+                <a:cs typeface="Calibri"/>
+                <a:sym typeface="Calibri"/>
+              </a:rPr>
+              <a:pPr algn="r">
+                <a:buSzPct val="25000"/>
+              </a:pPr>
+              <a:t>5</a:t>
+            </a:fld>
+            <a:endParaRPr lang="en-US" dirty="0">
+              <a:solidFill>
+                <a:srgbClr val="888888"/>
+              </a:solidFill>
+              <a:latin typeface="Calibri"/>
+              <a:ea typeface="Calibri"/>
+              <a:cs typeface="Calibri"/>
+              <a:sym typeface="Calibri"/>
+            </a:endParaRPr>
+          </a:p>
+        </p:txBody>
+      </p:sp>
     </p:spTree>
   </p:cSld>
   <p:clrMapOvr>
@@ -21748,45 +21809,6 @@
               <a:rPr lang="en-US" sz="3600"/>
               <a:t>Parallel Pothen-Fan</a:t>
             </a:r>
-          </a:p>
-        </p:txBody>
-      </p:sp>
-      <p:sp>
-        <p:nvSpPr>
-          <p:cNvPr id="211" name="Shape 211"/>
-          <p:cNvSpPr txBox="1">
-            <a:spLocks noGrp="1"/>
-          </p:cNvSpPr>
-          <p:nvPr>
-            <p:ph type="sldNum" idx="12"/>
-          </p:nvPr>
-        </p:nvSpPr>
-        <p:spPr>
-          <a:xfrm>
-            <a:off x="6457950" y="6356351"/>
-            <a:ext cx="2057400" cy="365099"/>
-          </a:xfrm>
-          <a:prstGeom prst="rect">
-            <a:avLst/>
-          </a:prstGeom>
-        </p:spPr>
-        <p:txBody>
-          <a:bodyPr lIns="91425" tIns="45700" rIns="91425" bIns="45700" anchor="ctr" anchorCtr="0">
-            <a:noAutofit/>
-          </a:bodyPr>
-          <a:lstStyle/>
-          <a:p>
-            <a:pPr lvl="0" rtl="0">
-              <a:spcBef>
-                <a:spcPts val="0"/>
-              </a:spcBef>
-              <a:buNone/>
-            </a:pPr>
-            <a:fld id="{00000000-1234-1234-1234-123412341234}" type="slidenum">
-              <a:rPr lang="en-US"/>
-              <a:t>6</a:t>
-            </a:fld>
-            <a:endParaRPr lang="en-US"/>
           </a:p>
         </p:txBody>
       </p:sp>
@@ -22548,13 +22570,16 @@
               <a:spcBef>
                 <a:spcPts val="0"/>
               </a:spcBef>
+              <a:spcAft>
+                <a:spcPts val="1200"/>
+              </a:spcAft>
             </a:pPr>
             <a:r>
-              <a:rPr lang="en-US"/>
+              <a:rPr lang="en-US" dirty="0"/>
               <a:t>Find augmenting paths in </a:t>
             </a:r>
             <a:r>
-              <a:rPr lang="en-US" b="1"/>
+              <a:rPr lang="en-US" b="1" dirty="0"/>
               <a:t>parallel</a:t>
             </a:r>
           </a:p>
@@ -22563,13 +22588,16 @@
               <a:spcBef>
                 <a:spcPts val="0"/>
               </a:spcBef>
+              <a:spcAft>
+                <a:spcPts val="1200"/>
+              </a:spcAft>
             </a:pPr>
             <a:r>
-              <a:rPr lang="en-US"/>
+              <a:rPr lang="en-US" dirty="0"/>
               <a:t>Paths must be </a:t>
             </a:r>
             <a:r>
-              <a:rPr lang="en-US" b="1"/>
+              <a:rPr lang="en-US" b="1" dirty="0"/>
               <a:t>vertex disjoint</a:t>
             </a:r>
           </a:p>
@@ -22578,9 +22606,12 @@
               <a:spcBef>
                 <a:spcPts val="0"/>
               </a:spcBef>
+              <a:spcAft>
+                <a:spcPts val="1200"/>
+              </a:spcAft>
             </a:pPr>
             <a:r>
-              <a:rPr lang="en-US"/>
+              <a:rPr lang="en-US" dirty="0"/>
               <a:t>DFS locks each visited vertex</a:t>
             </a:r>
           </a:p>
@@ -22589,9 +22620,12 @@
               <a:spcBef>
                 <a:spcPts val="0"/>
               </a:spcBef>
+              <a:spcAft>
+                <a:spcPts val="1200"/>
+              </a:spcAft>
             </a:pPr>
             <a:r>
-              <a:rPr lang="en-US"/>
+              <a:rPr lang="en-US" dirty="0"/>
               <a:t>Test and Test and Set</a:t>
             </a:r>
           </a:p>
@@ -22865,16 +22899,28 @@
         </p:nvSpPr>
         <p:spPr>
           <a:xfrm>
-            <a:off x="3711300" y="5242450"/>
-            <a:ext cx="5432700" cy="1479000"/>
+            <a:off x="2708900" y="5145312"/>
+            <a:ext cx="6293412" cy="1065073"/>
           </a:xfrm>
           <a:prstGeom prst="rect">
             <a:avLst/>
           </a:prstGeom>
-          <a:noFill/>
+          <a:solidFill>
+            <a:schemeClr val="accent6">
+              <a:lumMod val="20000"/>
+              <a:lumOff val="80000"/>
+            </a:schemeClr>
+          </a:solidFill>
           <a:ln>
             <a:noFill/>
           </a:ln>
+          <a:effectLst>
+            <a:outerShdw blurRad="50800" dist="38100" dir="2700000" algn="tl" rotWithShape="0">
+              <a:prstClr val="black">
+                <a:alpha val="40000"/>
+              </a:prstClr>
+            </a:outerShdw>
+          </a:effectLst>
         </p:spPr>
         <p:txBody>
           <a:bodyPr lIns="91425" tIns="91425" rIns="91425" bIns="91425" anchor="t" anchorCtr="0">
@@ -22894,7 +22940,7 @@
               <a:buNone/>
             </a:pPr>
             <a:r>
-              <a:rPr lang="en-US" sz="1600">
+              <a:rPr lang="en-US" sz="2000" dirty="0">
                 <a:latin typeface="Courier New"/>
                 <a:ea typeface="Courier New"/>
                 <a:cs typeface="Courier New"/>
@@ -22916,7 +22962,7 @@
               <a:buNone/>
             </a:pPr>
             <a:r>
-              <a:rPr lang="en-US" sz="1600">
+              <a:rPr lang="en-US" sz="2000" dirty="0">
                 <a:latin typeface="Courier New"/>
                 <a:ea typeface="Courier New"/>
                 <a:cs typeface="Courier New"/>
@@ -22938,7 +22984,7 @@
               <a:buNone/>
             </a:pPr>
             <a:r>
-              <a:rPr lang="en-US" sz="1600">
+              <a:rPr lang="en-US" sz="2000" dirty="0">
                 <a:latin typeface="Courier New"/>
                 <a:ea typeface="Courier New"/>
                 <a:cs typeface="Courier New"/>
@@ -22958,7 +23004,7 @@
               <a:buFont typeface="Arial"/>
               <a:buNone/>
             </a:pPr>
-            <a:endParaRPr sz="1600">
+            <a:endParaRPr sz="1600" dirty="0">
               <a:latin typeface="Courier New"/>
               <a:ea typeface="Courier New"/>
               <a:cs typeface="Courier New"/>
@@ -22972,7 +23018,7 @@
               </a:spcBef>
               <a:buNone/>
             </a:pPr>
-            <a:endParaRPr sz="1600">
+            <a:endParaRPr sz="1600" dirty="0">
               <a:latin typeface="Courier New"/>
               <a:ea typeface="Courier New"/>
               <a:cs typeface="Courier New"/>
@@ -23281,6 +23327,51 @@
           </p:txBody>
         </p:sp>
       </p:grpSp>
+      <p:sp>
+        <p:nvSpPr>
+          <p:cNvPr id="6" name="Foliennummernplatzhalter 5"/>
+          <p:cNvSpPr>
+            <a:spLocks noGrp="1"/>
+          </p:cNvSpPr>
+          <p:nvPr>
+            <p:ph type="sldNum" idx="12"/>
+          </p:nvPr>
+        </p:nvSpPr>
+        <p:spPr/>
+        <p:txBody>
+          <a:bodyPr/>
+          <a:lstStyle/>
+          <a:p>
+            <a:pPr algn="r">
+              <a:buSzPct val="25000"/>
+            </a:pPr>
+            <a:fld id="{00000000-1234-1234-1234-123412341234}" type="slidenum">
+              <a:rPr lang="en-US" smtClean="0">
+                <a:solidFill>
+                  <a:srgbClr val="888888"/>
+                </a:solidFill>
+                <a:latin typeface="Calibri"/>
+                <a:ea typeface="Calibri"/>
+                <a:cs typeface="Calibri"/>
+                <a:sym typeface="Calibri"/>
+              </a:rPr>
+              <a:pPr algn="r">
+                <a:buSzPct val="25000"/>
+              </a:pPr>
+              <a:t>6</a:t>
+            </a:fld>
+            <a:endParaRPr lang="en-US" dirty="0">
+              <a:solidFill>
+                <a:srgbClr val="888888"/>
+              </a:solidFill>
+              <a:latin typeface="Calibri"/>
+              <a:ea typeface="Calibri"/>
+              <a:cs typeface="Calibri"/>
+              <a:sym typeface="Calibri"/>
+            </a:endParaRPr>
+          </a:p>
+        </p:txBody>
+      </p:sp>
     </p:spTree>
   </p:cSld>
   <p:clrMapOvr>
@@ -23841,73 +23932,13 @@
       </p:sp>
       <p:sp>
         <p:nvSpPr>
-          <p:cNvPr id="256" name="Shape 256"/>
-          <p:cNvSpPr txBox="1">
-            <a:spLocks noGrp="1"/>
-          </p:cNvSpPr>
-          <p:nvPr>
-            <p:ph type="sldNum" idx="12"/>
-          </p:nvPr>
-        </p:nvSpPr>
-        <p:spPr>
-          <a:xfrm>
-            <a:off x="6457950" y="6356351"/>
-            <a:ext cx="2057400" cy="365099"/>
-          </a:xfrm>
-          <a:prstGeom prst="rect">
-            <a:avLst/>
-          </a:prstGeom>
-          <a:noFill/>
-          <a:ln>
-            <a:noFill/>
-          </a:ln>
-        </p:spPr>
-        <p:txBody>
-          <a:bodyPr lIns="91425" tIns="45700" rIns="91425" bIns="45700" anchor="ctr" anchorCtr="0">
-            <a:noAutofit/>
-          </a:bodyPr>
-          <a:lstStyle/>
-          <a:p>
-            <a:pPr marL="0" marR="0" lvl="0" indent="0" algn="r" rtl="0">
-              <a:spcBef>
-                <a:spcPts val="0"/>
-              </a:spcBef>
-              <a:buSzPct val="25000"/>
-              <a:buNone/>
-            </a:pPr>
-            <a:fld id="{00000000-1234-1234-1234-123412341234}" type="slidenum">
-              <a:rPr lang="en-US" sz="1200" b="0" i="0" u="none" strike="noStrike" cap="none">
-                <a:solidFill>
-                  <a:srgbClr val="888888"/>
-                </a:solidFill>
-                <a:latin typeface="Calibri"/>
-                <a:ea typeface="Calibri"/>
-                <a:cs typeface="Calibri"/>
-                <a:sym typeface="Calibri"/>
-              </a:rPr>
-              <a:t>7</a:t>
-            </a:fld>
-            <a:endParaRPr lang="en-US" sz="1200" b="0" i="0" u="none" strike="noStrike" cap="none">
-              <a:solidFill>
-                <a:srgbClr val="888888"/>
-              </a:solidFill>
-              <a:latin typeface="Calibri"/>
-              <a:ea typeface="Calibri"/>
-              <a:cs typeface="Calibri"/>
-              <a:sym typeface="Calibri"/>
-            </a:endParaRPr>
-          </a:p>
-        </p:txBody>
-      </p:sp>
-      <p:sp>
-        <p:nvSpPr>
           <p:cNvPr id="257" name="Shape 257"/>
           <p:cNvSpPr txBox="1"/>
           <p:nvPr/>
         </p:nvSpPr>
         <p:spPr>
           <a:xfrm>
-            <a:off x="153600" y="6508750"/>
+            <a:off x="167654" y="6357793"/>
             <a:ext cx="8684400" cy="365100"/>
           </a:xfrm>
           <a:prstGeom prst="rect">
@@ -23931,9 +23962,11 @@
               <a:buNone/>
             </a:pPr>
             <a:r>
-              <a:rPr lang="en-US">
-                <a:solidFill>
-                  <a:srgbClr val="666666"/>
+              <a:rPr lang="en-US" dirty="0">
+                <a:solidFill>
+                  <a:schemeClr val="tx2">
+                    <a:lumMod val="50000"/>
+                  </a:schemeClr>
                 </a:solidFill>
               </a:rPr>
               <a:t>Image source: http://hips.seas.harvard.edu/files/xeon-phi.jpg</a:t>
@@ -23973,7 +24006,13 @@
         <p:nvGraphicFramePr>
           <p:cNvPr id="259" name="Shape 259"/>
           <p:cNvGraphicFramePr/>
-          <p:nvPr/>
+          <p:nvPr>
+            <p:extLst>
+              <p:ext uri="{D42A27DB-BD31-4B8C-83A1-F6EECF244321}">
+                <p14:modId xmlns:p14="http://schemas.microsoft.com/office/powerpoint/2010/main" val="1178437887"/>
+              </p:ext>
+            </p:extLst>
+          </p:nvPr>
         </p:nvGraphicFramePr>
         <p:xfrm>
           <a:off x="2004300" y="3867247"/>
@@ -23983,14 +24022,37 @@
           <a:graphicData uri="http://schemas.openxmlformats.org/drawingml/2006/table">
             <a:tbl>
               <a:tblPr>
-                <a:noFill/>
-                <a:tableStyleId>{F2457CC4-3658-459D-8EC8-7F64A3CF185B}</a:tableStyleId>
+                <a:tableStyleId>{3C2FFA5D-87B4-456A-9821-1D502468CF0F}</a:tableStyleId>
               </a:tblPr>
               <a:tblGrid>
-                <a:gridCol w="1819725"/>
-                <a:gridCol w="1412725"/>
-                <a:gridCol w="1180075"/>
-                <a:gridCol w="1180075"/>
+                <a:gridCol w="1819725">
+                  <a:extLst>
+                    <a:ext uri="{9D8B030D-6E8A-4147-A177-3AD203B41FA5}">
+                      <a16:colId xmlns:a16="http://schemas.microsoft.com/office/drawing/2014/main" val="20000"/>
+                    </a:ext>
+                  </a:extLst>
+                </a:gridCol>
+                <a:gridCol w="1412725">
+                  <a:extLst>
+                    <a:ext uri="{9D8B030D-6E8A-4147-A177-3AD203B41FA5}">
+                      <a16:colId xmlns:a16="http://schemas.microsoft.com/office/drawing/2014/main" val="20001"/>
+                    </a:ext>
+                  </a:extLst>
+                </a:gridCol>
+                <a:gridCol w="1180075">
+                  <a:extLst>
+                    <a:ext uri="{9D8B030D-6E8A-4147-A177-3AD203B41FA5}">
+                      <a16:colId xmlns:a16="http://schemas.microsoft.com/office/drawing/2014/main" val="20002"/>
+                    </a:ext>
+                  </a:extLst>
+                </a:gridCol>
+                <a:gridCol w="1180075">
+                  <a:extLst>
+                    <a:ext uri="{9D8B030D-6E8A-4147-A177-3AD203B41FA5}">
+                      <a16:colId xmlns:a16="http://schemas.microsoft.com/office/drawing/2014/main" val="20003"/>
+                    </a:ext>
+                  </a:extLst>
+                </a:gridCol>
               </a:tblGrid>
               <a:tr h="761050">
                 <a:tc gridSpan="4">
@@ -24005,21 +24067,20 @@
                         <a:buNone/>
                       </a:pPr>
                       <a:r>
-                        <a:rPr lang="en-US" sz="3600">
-                          <a:latin typeface="Calibri"/>
-                          <a:ea typeface="Calibri"/>
-                          <a:cs typeface="Calibri"/>
+                        <a:rPr lang="en-US" sz="3600" dirty="0">
                           <a:sym typeface="Calibri"/>
                         </a:rPr>
                         <a:t>Test Data</a:t>
                       </a:r>
+                      <a:endParaRPr lang="en-US" sz="3600" dirty="0">
+                        <a:latin typeface="Calibri"/>
+                        <a:ea typeface="Calibri"/>
+                        <a:cs typeface="Calibri"/>
+                        <a:sym typeface="Calibri"/>
+                      </a:endParaRPr>
                     </a:p>
                   </a:txBody>
-                  <a:tcPr marL="91425" marR="91425" marT="91425" marB="91425">
-                    <a:solidFill>
-                      <a:schemeClr val="lt1"/>
-                    </a:solidFill>
-                  </a:tcPr>
+                  <a:tcPr marL="91425" marR="91425" marT="91425" marB="91425"/>
                 </a:tc>
                 <a:tc hMerge="1">
                   <a:txBody>
@@ -24051,6 +24112,11 @@
                   </a:txBody>
                   <a:tcPr/>
                 </a:tc>
+                <a:extLst>
+                  <a:ext uri="{0D108BD9-81ED-4DB2-BD59-A6C34878D82A}">
+                    <a16:rowId xmlns:a16="http://schemas.microsoft.com/office/drawing/2014/main" val="10000"/>
+                  </a:ext>
+                </a:extLst>
               </a:tr>
               <a:tr h="410075">
                 <a:tc>
@@ -24072,11 +24138,34 @@
                       </a:endParaRPr>
                     </a:p>
                   </a:txBody>
-                  <a:tcPr marL="91425" marR="91425" marT="91425" marB="91425">
-                    <a:solidFill>
-                      <a:schemeClr val="lt1"/>
-                    </a:solidFill>
-                  </a:tcPr>
+                  <a:tcPr marL="91425" marR="91425" marT="91425" marB="91425"/>
+                </a:tc>
+                <a:tc>
+                  <a:txBody>
+                    <a:bodyPr/>
+                    <a:lstStyle/>
+                    <a:p>
+                      <a:pPr lvl="0" rtl="0">
+                        <a:spcBef>
+                          <a:spcPts val="0"/>
+                        </a:spcBef>
+                        <a:buNone/>
+                      </a:pPr>
+                      <a:r>
+                        <a:rPr lang="en-US" dirty="0">
+                          <a:sym typeface="Calibri"/>
+                        </a:rPr>
+                        <a:t>|V|</a:t>
+                      </a:r>
+                      <a:endParaRPr lang="en-US" dirty="0">
+                        <a:latin typeface="Calibri"/>
+                        <a:ea typeface="Calibri"/>
+                        <a:cs typeface="Calibri"/>
+                        <a:sym typeface="Calibri"/>
+                      </a:endParaRPr>
+                    </a:p>
+                  </a:txBody>
+                  <a:tcPr marL="91425" marR="91425" marT="91425" marB="91425"/>
                 </a:tc>
                 <a:tc>
                   <a:txBody>
@@ -24091,20 +24180,19 @@
                       </a:pPr>
                       <a:r>
                         <a:rPr lang="en-US">
-                          <a:latin typeface="Calibri"/>
-                          <a:ea typeface="Calibri"/>
-                          <a:cs typeface="Calibri"/>
                           <a:sym typeface="Calibri"/>
                         </a:rPr>
-                        <a:t>|V|</a:t>
+                        <a:t>|E|</a:t>
                       </a:r>
+                      <a:endParaRPr lang="en-US">
+                        <a:latin typeface="Calibri"/>
+                        <a:ea typeface="Calibri"/>
+                        <a:cs typeface="Calibri"/>
+                        <a:sym typeface="Calibri"/>
+                      </a:endParaRPr>
                     </a:p>
                   </a:txBody>
-                  <a:tcPr marL="91425" marR="91425" marT="91425" marB="91425">
-                    <a:solidFill>
-                      <a:schemeClr val="lt1"/>
-                    </a:solidFill>
-                  </a:tcPr>
+                  <a:tcPr marL="91425" marR="91425" marT="91425" marB="91425"/>
                 </a:tc>
                 <a:tc>
                   <a:txBody>
@@ -24119,49 +24207,25 @@
                       </a:pPr>
                       <a:r>
                         <a:rPr lang="en-US">
-                          <a:latin typeface="Calibri"/>
-                          <a:ea typeface="Calibri"/>
-                          <a:cs typeface="Calibri"/>
-                          <a:sym typeface="Calibri"/>
-                        </a:rPr>
-                        <a:t>|E|</a:t>
-                      </a:r>
-                    </a:p>
-                  </a:txBody>
-                  <a:tcPr marL="91425" marR="91425" marT="91425" marB="91425">
-                    <a:solidFill>
-                      <a:schemeClr val="lt1"/>
-                    </a:solidFill>
-                  </a:tcPr>
-                </a:tc>
-                <a:tc>
-                  <a:txBody>
-                    <a:bodyPr/>
-                    <a:lstStyle/>
-                    <a:p>
-                      <a:pPr lvl="0" rtl="0">
-                        <a:spcBef>
-                          <a:spcPts val="0"/>
-                        </a:spcBef>
-                        <a:buNone/>
-                      </a:pPr>
-                      <a:r>
-                        <a:rPr lang="en-US">
-                          <a:latin typeface="Calibri"/>
-                          <a:ea typeface="Calibri"/>
-                          <a:cs typeface="Calibri"/>
                           <a:sym typeface="Calibri"/>
                         </a:rPr>
                         <a:t>Density [0,1]</a:t>
                       </a:r>
+                      <a:endParaRPr lang="en-US">
+                        <a:latin typeface="Calibri"/>
+                        <a:ea typeface="Calibri"/>
+                        <a:cs typeface="Calibri"/>
+                        <a:sym typeface="Calibri"/>
+                      </a:endParaRPr>
                     </a:p>
                   </a:txBody>
-                  <a:tcPr marL="91425" marR="91425" marT="91425" marB="91425">
-                    <a:solidFill>
-                      <a:schemeClr val="lt1"/>
-                    </a:solidFill>
-                  </a:tcPr>
+                  <a:tcPr marL="91425" marR="91425" marT="91425" marB="91425"/>
                 </a:tc>
+                <a:extLst>
+                  <a:ext uri="{0D108BD9-81ED-4DB2-BD59-A6C34878D82A}">
+                    <a16:rowId xmlns:a16="http://schemas.microsoft.com/office/drawing/2014/main" val="10001"/>
+                  </a:ext>
+                </a:extLst>
               </a:tr>
               <a:tr h="410075">
                 <a:tc>
@@ -24177,20 +24241,73 @@
                       </a:pPr>
                       <a:r>
                         <a:rPr lang="en-US">
-                          <a:latin typeface="Calibri"/>
-                          <a:ea typeface="Calibri"/>
-                          <a:cs typeface="Calibri"/>
                           <a:sym typeface="Calibri"/>
                         </a:rPr>
                         <a:t>coPaperDBLP</a:t>
                       </a:r>
+                      <a:endParaRPr lang="en-US">
+                        <a:latin typeface="Calibri"/>
+                        <a:ea typeface="Calibri"/>
+                        <a:cs typeface="Calibri"/>
+                        <a:sym typeface="Calibri"/>
+                      </a:endParaRPr>
                     </a:p>
                   </a:txBody>
-                  <a:tcPr marL="91425" marR="91425" marT="91425" marB="91425">
-                    <a:solidFill>
-                      <a:schemeClr val="lt1"/>
-                    </a:solidFill>
-                  </a:tcPr>
+                  <a:tcPr marL="91425" marR="91425" marT="91425" marB="91425"/>
+                </a:tc>
+                <a:tc>
+                  <a:txBody>
+                    <a:bodyPr/>
+                    <a:lstStyle/>
+                    <a:p>
+                      <a:pPr lvl="0" rtl="0">
+                        <a:spcBef>
+                          <a:spcPts val="0"/>
+                        </a:spcBef>
+                        <a:buNone/>
+                      </a:pPr>
+                      <a:r>
+                        <a:rPr lang="en-US" dirty="0">
+                          <a:sym typeface="Calibri"/>
+                        </a:rPr>
+                        <a:t>1’080’872</a:t>
+                      </a:r>
+                      <a:endParaRPr lang="en-US" dirty="0">
+                        <a:latin typeface="Calibri"/>
+                        <a:ea typeface="Calibri"/>
+                        <a:cs typeface="Calibri"/>
+                        <a:sym typeface="Calibri"/>
+                      </a:endParaRPr>
+                    </a:p>
+                  </a:txBody>
+                  <a:tcPr marL="91425" marR="91425" marT="91425" marB="91425"/>
+                </a:tc>
+                <a:tc>
+                  <a:txBody>
+                    <a:bodyPr/>
+                    <a:lstStyle/>
+                    <a:p>
+                      <a:pPr lvl="0" rtl="0">
+                        <a:spcBef>
+                          <a:spcPts val="0"/>
+                        </a:spcBef>
+                        <a:buNone/>
+                      </a:pPr>
+                      <a:r>
+                        <a:rPr lang="en-US" dirty="0">
+                          <a:sym typeface="Calibri"/>
+                        </a:rPr>
+                        <a:t>15’245’732</a:t>
+                      </a:r>
+                      <a:endParaRPr lang="en-US" dirty="0">
+                        <a:latin typeface="Calibri"/>
+                        <a:ea typeface="Calibri"/>
+                        <a:cs typeface="Calibri"/>
+                        <a:sym typeface="Calibri"/>
+                      </a:endParaRPr>
+                    </a:p>
+                  </a:txBody>
+                  <a:tcPr marL="91425" marR="91425" marT="91425" marB="91425"/>
                 </a:tc>
                 <a:tc>
                   <a:txBody>
@@ -24205,77 +24322,25 @@
                       </a:pPr>
                       <a:r>
                         <a:rPr lang="en-US">
-                          <a:latin typeface="Calibri"/>
-                          <a:ea typeface="Calibri"/>
-                          <a:cs typeface="Calibri"/>
-                          <a:sym typeface="Calibri"/>
-                        </a:rPr>
-                        <a:t>1’080’872</a:t>
-                      </a:r>
-                    </a:p>
-                  </a:txBody>
-                  <a:tcPr marL="91425" marR="91425" marT="91425" marB="91425">
-                    <a:solidFill>
-                      <a:schemeClr val="lt1"/>
-                    </a:solidFill>
-                  </a:tcPr>
-                </a:tc>
-                <a:tc>
-                  <a:txBody>
-                    <a:bodyPr/>
-                    <a:lstStyle/>
-                    <a:p>
-                      <a:pPr lvl="0" rtl="0">
-                        <a:spcBef>
-                          <a:spcPts val="0"/>
-                        </a:spcBef>
-                        <a:buNone/>
-                      </a:pPr>
-                      <a:r>
-                        <a:rPr lang="en-US">
-                          <a:latin typeface="Calibri"/>
-                          <a:ea typeface="Calibri"/>
-                          <a:cs typeface="Calibri"/>
-                          <a:sym typeface="Calibri"/>
-                        </a:rPr>
-                        <a:t>15’245’732</a:t>
-                      </a:r>
-                    </a:p>
-                  </a:txBody>
-                  <a:tcPr marL="91425" marR="91425" marT="91425" marB="91425">
-                    <a:solidFill>
-                      <a:schemeClr val="lt1"/>
-                    </a:solidFill>
-                  </a:tcPr>
-                </a:tc>
-                <a:tc>
-                  <a:txBody>
-                    <a:bodyPr/>
-                    <a:lstStyle/>
-                    <a:p>
-                      <a:pPr lvl="0" rtl="0">
-                        <a:spcBef>
-                          <a:spcPts val="0"/>
-                        </a:spcBef>
-                        <a:buNone/>
-                      </a:pPr>
-                      <a:r>
-                        <a:rPr lang="en-US">
-                          <a:latin typeface="Calibri"/>
-                          <a:ea typeface="Calibri"/>
-                          <a:cs typeface="Calibri"/>
                           <a:sym typeface="Calibri"/>
                         </a:rPr>
                         <a:t>1.3e-5</a:t>
                       </a:r>
+                      <a:endParaRPr lang="en-US">
+                        <a:latin typeface="Calibri"/>
+                        <a:ea typeface="Calibri"/>
+                        <a:cs typeface="Calibri"/>
+                        <a:sym typeface="Calibri"/>
+                      </a:endParaRPr>
                     </a:p>
                   </a:txBody>
-                  <a:tcPr marL="91425" marR="91425" marT="91425" marB="91425">
-                    <a:solidFill>
-                      <a:schemeClr val="lt1"/>
-                    </a:solidFill>
-                  </a:tcPr>
+                  <a:tcPr marL="91425" marR="91425" marT="91425" marB="91425"/>
                 </a:tc>
+                <a:extLst>
+                  <a:ext uri="{0D108BD9-81ED-4DB2-BD59-A6C34878D82A}">
+                    <a16:rowId xmlns:a16="http://schemas.microsoft.com/office/drawing/2014/main" val="10002"/>
+                  </a:ext>
+                </a:extLst>
               </a:tr>
               <a:tr h="410075">
                 <a:tc>
@@ -24291,20 +24356,19 @@
                       </a:pPr>
                       <a:r>
                         <a:rPr lang="en-US">
-                          <a:latin typeface="Calibri"/>
-                          <a:ea typeface="Calibri"/>
-                          <a:cs typeface="Calibri"/>
                           <a:sym typeface="Calibri"/>
                         </a:rPr>
                         <a:t>Wikipedia</a:t>
                       </a:r>
+                      <a:endParaRPr lang="en-US">
+                        <a:latin typeface="Calibri"/>
+                        <a:ea typeface="Calibri"/>
+                        <a:cs typeface="Calibri"/>
+                        <a:sym typeface="Calibri"/>
+                      </a:endParaRPr>
                     </a:p>
                   </a:txBody>
-                  <a:tcPr marL="91425" marR="91425" marT="91425" marB="91425">
-                    <a:solidFill>
-                      <a:schemeClr val="lt1"/>
-                    </a:solidFill>
-                  </a:tcPr>
+                  <a:tcPr marL="91425" marR="91425" marT="91425" marB="91425"/>
                 </a:tc>
                 <a:tc>
                   <a:txBody>
@@ -24319,20 +24383,19 @@
                       </a:pPr>
                       <a:r>
                         <a:rPr lang="en-US">
-                          <a:latin typeface="Calibri"/>
-                          <a:ea typeface="Calibri"/>
-                          <a:cs typeface="Calibri"/>
                           <a:sym typeface="Calibri"/>
                         </a:rPr>
                         <a:t>7’030’396</a:t>
                       </a:r>
+                      <a:endParaRPr lang="en-US">
+                        <a:latin typeface="Calibri"/>
+                        <a:ea typeface="Calibri"/>
+                        <a:cs typeface="Calibri"/>
+                        <a:sym typeface="Calibri"/>
+                      </a:endParaRPr>
                     </a:p>
                   </a:txBody>
-                  <a:tcPr marL="91425" marR="91425" marT="91425" marB="91425">
-                    <a:solidFill>
-                      <a:schemeClr val="lt1"/>
-                    </a:solidFill>
-                  </a:tcPr>
+                  <a:tcPr marL="91425" marR="91425" marT="91425" marB="91425"/>
                 </a:tc>
                 <a:tc>
                   <a:txBody>
@@ -24346,21 +24409,20 @@
                         <a:buNone/>
                       </a:pPr>
                       <a:r>
-                        <a:rPr lang="en-US">
-                          <a:latin typeface="Calibri"/>
-                          <a:ea typeface="Calibri"/>
-                          <a:cs typeface="Calibri"/>
+                        <a:rPr lang="en-US" dirty="0">
                           <a:sym typeface="Calibri"/>
                         </a:rPr>
                         <a:t>45’030’392</a:t>
                       </a:r>
+                      <a:endParaRPr lang="en-US" dirty="0">
+                        <a:latin typeface="Calibri"/>
+                        <a:ea typeface="Calibri"/>
+                        <a:cs typeface="Calibri"/>
+                        <a:sym typeface="Calibri"/>
+                      </a:endParaRPr>
                     </a:p>
                   </a:txBody>
-                  <a:tcPr marL="91425" marR="91425" marT="91425" marB="91425">
-                    <a:solidFill>
-                      <a:schemeClr val="lt1"/>
-                    </a:solidFill>
-                  </a:tcPr>
+                  <a:tcPr marL="91425" marR="91425" marT="91425" marB="91425"/>
                 </a:tc>
                 <a:tc>
                   <a:txBody>
@@ -24374,22 +24436,26 @@
                         <a:buNone/>
                       </a:pPr>
                       <a:r>
-                        <a:rPr lang="en-US">
-                          <a:latin typeface="Calibri"/>
-                          <a:ea typeface="Calibri"/>
-                          <a:cs typeface="Calibri"/>
+                        <a:rPr lang="en-US" dirty="0">
                           <a:sym typeface="Calibri"/>
                         </a:rPr>
                         <a:t>9.1e-7</a:t>
                       </a:r>
+                      <a:endParaRPr lang="en-US" dirty="0">
+                        <a:latin typeface="Calibri"/>
+                        <a:ea typeface="Calibri"/>
+                        <a:cs typeface="Calibri"/>
+                        <a:sym typeface="Calibri"/>
+                      </a:endParaRPr>
                     </a:p>
                   </a:txBody>
-                  <a:tcPr marL="91425" marR="91425" marT="91425" marB="91425">
-                    <a:solidFill>
-                      <a:schemeClr val="lt1"/>
-                    </a:solidFill>
-                  </a:tcPr>
+                  <a:tcPr marL="91425" marR="91425" marT="91425" marB="91425"/>
                 </a:tc>
+                <a:extLst>
+                  <a:ext uri="{0D108BD9-81ED-4DB2-BD59-A6C34878D82A}">
+                    <a16:rowId xmlns:a16="http://schemas.microsoft.com/office/drawing/2014/main" val="10003"/>
+                  </a:ext>
+                </a:extLst>
               </a:tr>
               <a:tr h="410075">
                 <a:tc>
@@ -24405,20 +24471,19 @@
                       </a:pPr>
                       <a:r>
                         <a:rPr lang="en-US">
-                          <a:latin typeface="Calibri"/>
-                          <a:ea typeface="Calibri"/>
-                          <a:cs typeface="Calibri"/>
                           <a:sym typeface="Calibri"/>
                         </a:rPr>
                         <a:t>Amazon0312</a:t>
                       </a:r>
+                      <a:endParaRPr lang="en-US">
+                        <a:latin typeface="Calibri"/>
+                        <a:ea typeface="Calibri"/>
+                        <a:cs typeface="Calibri"/>
+                        <a:sym typeface="Calibri"/>
+                      </a:endParaRPr>
                     </a:p>
                   </a:txBody>
-                  <a:tcPr marL="91425" marR="91425" marT="91425" marB="91425">
-                    <a:solidFill>
-                      <a:schemeClr val="lt1"/>
-                    </a:solidFill>
-                  </a:tcPr>
+                  <a:tcPr marL="91425" marR="91425" marT="91425" marB="91425"/>
                 </a:tc>
                 <a:tc>
                   <a:txBody>
@@ -24433,20 +24498,19 @@
                       </a:pPr>
                       <a:r>
                         <a:rPr lang="en-US">
-                          <a:latin typeface="Calibri"/>
-                          <a:ea typeface="Calibri"/>
-                          <a:cs typeface="Calibri"/>
                           <a:sym typeface="Calibri"/>
                         </a:rPr>
                         <a:t>801’454</a:t>
                       </a:r>
+                      <a:endParaRPr lang="en-US">
+                        <a:latin typeface="Calibri"/>
+                        <a:ea typeface="Calibri"/>
+                        <a:cs typeface="Calibri"/>
+                        <a:sym typeface="Calibri"/>
+                      </a:endParaRPr>
                     </a:p>
                   </a:txBody>
-                  <a:tcPr marL="91425" marR="91425" marT="91425" marB="91425">
-                    <a:solidFill>
-                      <a:schemeClr val="lt1"/>
-                    </a:solidFill>
-                  </a:tcPr>
+                  <a:tcPr marL="91425" marR="91425" marT="91425" marB="91425"/>
                 </a:tc>
                 <a:tc>
                   <a:txBody>
@@ -24461,20 +24525,19 @@
                       </a:pPr>
                       <a:r>
                         <a:rPr lang="en-US">
-                          <a:latin typeface="Calibri"/>
-                          <a:ea typeface="Calibri"/>
-                          <a:cs typeface="Calibri"/>
                           <a:sym typeface="Calibri"/>
                         </a:rPr>
                         <a:t>3’200’440</a:t>
                       </a:r>
+                      <a:endParaRPr lang="en-US">
+                        <a:latin typeface="Calibri"/>
+                        <a:ea typeface="Calibri"/>
+                        <a:cs typeface="Calibri"/>
+                        <a:sym typeface="Calibri"/>
+                      </a:endParaRPr>
                     </a:p>
                   </a:txBody>
-                  <a:tcPr marL="91425" marR="91425" marT="91425" marB="91425">
-                    <a:solidFill>
-                      <a:schemeClr val="lt1"/>
-                    </a:solidFill>
-                  </a:tcPr>
+                  <a:tcPr marL="91425" marR="91425" marT="91425" marB="91425"/>
                 </a:tc>
                 <a:tc>
                   <a:txBody>
@@ -24488,39 +24551,82 @@
                         <a:buNone/>
                       </a:pPr>
                       <a:r>
-                        <a:rPr lang="en-US">
-                          <a:latin typeface="Calibri"/>
-                          <a:ea typeface="Calibri"/>
-                          <a:cs typeface="Calibri"/>
+                        <a:rPr lang="en-US" dirty="0">
                           <a:sym typeface="Calibri"/>
                         </a:rPr>
                         <a:t>5.0e-6</a:t>
                       </a:r>
+                      <a:endParaRPr lang="en-US" dirty="0">
+                        <a:latin typeface="Calibri"/>
+                        <a:ea typeface="Calibri"/>
+                        <a:cs typeface="Calibri"/>
+                        <a:sym typeface="Calibri"/>
+                      </a:endParaRPr>
                     </a:p>
                   </a:txBody>
-                  <a:tcPr marL="91425" marR="91425" marT="91425" marB="91425">
-                    <a:solidFill>
-                      <a:schemeClr val="lt1"/>
-                    </a:solidFill>
-                  </a:tcPr>
+                  <a:tcPr marL="91425" marR="91425" marT="91425" marB="91425"/>
                 </a:tc>
+                <a:extLst>
+                  <a:ext uri="{0D108BD9-81ED-4DB2-BD59-A6C34878D82A}">
+                    <a16:rowId xmlns:a16="http://schemas.microsoft.com/office/drawing/2014/main" val="10004"/>
+                  </a:ext>
+                </a:extLst>
               </a:tr>
             </a:tbl>
           </a:graphicData>
         </a:graphic>
       </p:graphicFrame>
+      <p:sp>
+        <p:nvSpPr>
+          <p:cNvPr id="6" name="Foliennummernplatzhalter 5"/>
+          <p:cNvSpPr>
+            <a:spLocks noGrp="1"/>
+          </p:cNvSpPr>
+          <p:nvPr>
+            <p:ph type="sldNum" idx="12"/>
+          </p:nvPr>
+        </p:nvSpPr>
+        <p:spPr/>
+        <p:txBody>
+          <a:bodyPr/>
+          <a:lstStyle/>
+          <a:p>
+            <a:pPr marL="0" marR="0" lvl="0" indent="0" algn="r" rtl="0">
+              <a:spcBef>
+                <a:spcPts val="0"/>
+              </a:spcBef>
+              <a:buSzPct val="25000"/>
+              <a:buNone/>
+            </a:pPr>
+            <a:fld id="{00000000-1234-1234-1234-123412341234}" type="slidenum">
+              <a:rPr lang="en-US" sz="1200" b="0" i="0" u="none" strike="noStrike" cap="none" smtClean="0">
+                <a:solidFill>
+                  <a:srgbClr val="888888"/>
+                </a:solidFill>
+                <a:latin typeface="Calibri"/>
+                <a:ea typeface="Calibri"/>
+                <a:cs typeface="Calibri"/>
+                <a:sym typeface="Calibri"/>
+              </a:rPr>
+              <a:t>7</a:t>
+            </a:fld>
+            <a:endParaRPr lang="en-US" sz="1200" b="0" i="0" u="none" strike="noStrike" cap="none">
+              <a:solidFill>
+                <a:srgbClr val="888888"/>
+              </a:solidFill>
+              <a:latin typeface="Calibri"/>
+              <a:ea typeface="Calibri"/>
+              <a:cs typeface="Calibri"/>
+              <a:sym typeface="Calibri"/>
+            </a:endParaRPr>
+          </a:p>
+        </p:txBody>
+      </p:sp>
     </p:spTree>
   </p:cSld>
   <p:clrMapOvr>
     <a:masterClrMapping/>
   </p:clrMapOvr>
-  <p:timing>
-    <p:tnLst>
-      <p:par>
-        <p:cTn id="1" dur="indefinite" restart="never" nodeType="tmRoot"/>
-      </p:par>
-    </p:tnLst>
-  </p:timing>
 </p:sld>
 </file>
 
@@ -24541,50 +24647,6 @@
           <a:chExt cx="0" cy="0"/>
         </a:xfrm>
       </p:grpSpPr>
-      <p:sp>
-        <p:nvSpPr>
-          <p:cNvPr id="265" name="Shape 265"/>
-          <p:cNvSpPr txBox="1">
-            <a:spLocks noGrp="1"/>
-          </p:cNvSpPr>
-          <p:nvPr>
-            <p:ph type="sldNum" idx="12"/>
-          </p:nvPr>
-        </p:nvSpPr>
-        <p:spPr>
-          <a:xfrm>
-            <a:off x="6457950" y="6356351"/>
-            <a:ext cx="2057400" cy="365099"/>
-          </a:xfrm>
-          <a:prstGeom prst="rect">
-            <a:avLst/>
-          </a:prstGeom>
-        </p:spPr>
-        <p:txBody>
-          <a:bodyPr lIns="91425" tIns="45700" rIns="91425" bIns="45700" anchor="ctr" anchorCtr="0">
-            <a:noAutofit/>
-          </a:bodyPr>
-          <a:lstStyle/>
-          <a:p>
-            <a:pPr lvl="0">
-              <a:spcBef>
-                <a:spcPts val="0"/>
-              </a:spcBef>
-              <a:buClr>
-                <a:srgbClr val="000000"/>
-              </a:buClr>
-              <a:buSzPct val="25000"/>
-              <a:buFont typeface="Arial"/>
-              <a:buNone/>
-            </a:pPr>
-            <a:fld id="{00000000-1234-1234-1234-123412341234}" type="slidenum">
-              <a:rPr lang="en-US"/>
-              <a:t>8</a:t>
-            </a:fld>
-            <a:endParaRPr lang="en-US"/>
-          </a:p>
-        </p:txBody>
-      </p:sp>
       <p:sp>
         <p:nvSpPr>
           <p:cNvPr id="266" name="Shape 266"/>
@@ -24685,6 +24747,52 @@
           </a:ln>
         </p:spPr>
       </p:pic>
+      <p:sp>
+        <p:nvSpPr>
+          <p:cNvPr id="6" name="Foliennummernplatzhalter 5"/>
+          <p:cNvSpPr>
+            <a:spLocks noGrp="1"/>
+          </p:cNvSpPr>
+          <p:nvPr>
+            <p:ph type="sldNum" idx="12"/>
+          </p:nvPr>
+        </p:nvSpPr>
+        <p:spPr/>
+        <p:txBody>
+          <a:bodyPr/>
+          <a:lstStyle/>
+          <a:p>
+            <a:pPr marL="0" marR="0" lvl="0" indent="0" algn="r" rtl="0">
+              <a:spcBef>
+                <a:spcPts val="0"/>
+              </a:spcBef>
+              <a:buSzPct val="25000"/>
+              <a:buNone/>
+            </a:pPr>
+            <a:fld id="{00000000-1234-1234-1234-123412341234}" type="slidenum">
+              <a:rPr lang="en-US" sz="1200" smtClean="0">
+                <a:solidFill>
+                  <a:srgbClr val="888888"/>
+                </a:solidFill>
+                <a:latin typeface="Calibri"/>
+                <a:ea typeface="Calibri"/>
+                <a:cs typeface="Calibri"/>
+                <a:sym typeface="Calibri"/>
+              </a:rPr>
+              <a:t>8</a:t>
+            </a:fld>
+            <a:endParaRPr lang="en-US" sz="1200">
+              <a:solidFill>
+                <a:srgbClr val="888888"/>
+              </a:solidFill>
+              <a:latin typeface="Calibri"/>
+              <a:ea typeface="Calibri"/>
+              <a:cs typeface="Calibri"/>
+              <a:sym typeface="Calibri"/>
+            </a:endParaRPr>
+          </a:p>
+        </p:txBody>
+      </p:sp>
     </p:spTree>
   </p:cSld>
   <p:clrMapOvr>
@@ -24828,50 +24936,6 @@
               <a:rPr lang="en-US" sz="3600"/>
               <a:t>Parallel Pothen-Fan - PRAM</a:t>
             </a:r>
-          </a:p>
-        </p:txBody>
-      </p:sp>
-      <p:sp>
-        <p:nvSpPr>
-          <p:cNvPr id="275" name="Shape 275"/>
-          <p:cNvSpPr txBox="1">
-            <a:spLocks noGrp="1"/>
-          </p:cNvSpPr>
-          <p:nvPr>
-            <p:ph type="sldNum" idx="12"/>
-          </p:nvPr>
-        </p:nvSpPr>
-        <p:spPr>
-          <a:xfrm>
-            <a:off x="6457950" y="6356351"/>
-            <a:ext cx="2057400" cy="365099"/>
-          </a:xfrm>
-          <a:prstGeom prst="rect">
-            <a:avLst/>
-          </a:prstGeom>
-        </p:spPr>
-        <p:txBody>
-          <a:bodyPr lIns="91425" tIns="45700" rIns="91425" bIns="45700" anchor="ctr" anchorCtr="0">
-            <a:noAutofit/>
-          </a:bodyPr>
-          <a:lstStyle/>
-          <a:p>
-            <a:pPr lvl="0">
-              <a:spcBef>
-                <a:spcPts val="0"/>
-              </a:spcBef>
-              <a:buClr>
-                <a:srgbClr val="000000"/>
-              </a:buClr>
-              <a:buSzPct val="25000"/>
-              <a:buFont typeface="Arial"/>
-              <a:buNone/>
-            </a:pPr>
-            <a:fld id="{00000000-1234-1234-1234-123412341234}" type="slidenum">
-              <a:rPr lang="en-US"/>
-              <a:t>9</a:t>
-            </a:fld>
-            <a:endParaRPr lang="en-US"/>
           </a:p>
         </p:txBody>
       </p:sp>
@@ -27254,6 +27318,52 @@
           </a:p>
         </p:txBody>
       </p:sp>
+      <p:sp>
+        <p:nvSpPr>
+          <p:cNvPr id="6" name="Foliennummernplatzhalter 5"/>
+          <p:cNvSpPr>
+            <a:spLocks noGrp="1"/>
+          </p:cNvSpPr>
+          <p:nvPr>
+            <p:ph type="sldNum" idx="12"/>
+          </p:nvPr>
+        </p:nvSpPr>
+        <p:spPr/>
+        <p:txBody>
+          <a:bodyPr/>
+          <a:lstStyle/>
+          <a:p>
+            <a:pPr marL="0" marR="0" lvl="0" indent="0" algn="r" rtl="0">
+              <a:spcBef>
+                <a:spcPts val="0"/>
+              </a:spcBef>
+              <a:buSzPct val="25000"/>
+              <a:buNone/>
+            </a:pPr>
+            <a:fld id="{00000000-1234-1234-1234-123412341234}" type="slidenum">
+              <a:rPr lang="en-US" sz="1200" smtClean="0">
+                <a:solidFill>
+                  <a:srgbClr val="888888"/>
+                </a:solidFill>
+                <a:latin typeface="Calibri"/>
+                <a:ea typeface="Calibri"/>
+                <a:cs typeface="Calibri"/>
+                <a:sym typeface="Calibri"/>
+              </a:rPr>
+              <a:t>9</a:t>
+            </a:fld>
+            <a:endParaRPr lang="en-US" sz="1200" dirty="0">
+              <a:solidFill>
+                <a:srgbClr val="888888"/>
+              </a:solidFill>
+              <a:latin typeface="Calibri"/>
+              <a:ea typeface="Calibri"/>
+              <a:cs typeface="Calibri"/>
+              <a:sym typeface="Calibri"/>
+            </a:endParaRPr>
+          </a:p>
+        </p:txBody>
+      </p:sp>
     </p:spTree>
   </p:cSld>
   <p:clrMapOvr>
@@ -27271,6 +27381,9 @@
                     <p:cTn id="3" fill="hold">
                       <p:stCondLst>
                         <p:cond delay="indefinite"/>
+                        <p:cond evt="onBegin" delay="0">
+                          <p:tn val="2"/>
+                        </p:cond>
                       </p:stCondLst>
                       <p:childTnLst>
                         <p:par>
@@ -27280,7 +27393,7 @@
                             </p:stCondLst>
                             <p:childTnLst>
                               <p:par>
-                                <p:cTn id="5" presetID="10" presetClass="entr" presetSubtype="0" fill="hold" nodeType="clickEffect">
+                                <p:cTn id="5" presetID="10" presetClass="entr" presetSubtype="0" fill="hold" nodeType="withEffect">
                                   <p:stCondLst>
                                     <p:cond delay="0"/>
                                   </p:stCondLst>
@@ -27293,7 +27406,7 @@
                                           </p:stCondLst>
                                         </p:cTn>
                                         <p:tgtEl>
-                                          <p:spTgt spid="275"/>
+                                          <p:spTgt spid="297"/>
                                         </p:tgtEl>
                                         <p:attrNameLst>
                                           <p:attrName>style.visibility</p:attrName>
@@ -27307,7 +27420,7 @@
                                       <p:cBhvr>
                                         <p:cTn id="7" dur="1"/>
                                         <p:tgtEl>
-                                          <p:spTgt spid="275"/>
+                                          <p:spTgt spid="297"/>
                                         </p:tgtEl>
                                       </p:cBhvr>
                                     </p:animEffect>
@@ -27328,7 +27441,7 @@
                                           </p:stCondLst>
                                         </p:cTn>
                                         <p:tgtEl>
-                                          <p:spTgt spid="297"/>
+                                          <p:spTgt spid="298"/>
                                         </p:tgtEl>
                                         <p:attrNameLst>
                                           <p:attrName>style.visibility</p:attrName>
@@ -27342,7 +27455,7 @@
                                       <p:cBhvr>
                                         <p:cTn id="10" dur="1"/>
                                         <p:tgtEl>
-                                          <p:spTgt spid="297"/>
+                                          <p:spTgt spid="298"/>
                                         </p:tgtEl>
                                       </p:cBhvr>
                                     </p:animEffect>
@@ -27363,7 +27476,7 @@
                                           </p:stCondLst>
                                         </p:cTn>
                                         <p:tgtEl>
-                                          <p:spTgt spid="298"/>
+                                          <p:spTgt spid="299"/>
                                         </p:tgtEl>
                                         <p:attrNameLst>
                                           <p:attrName>style.visibility</p:attrName>
@@ -27376,41 +27489,6 @@
                                     <p:animEffect transition="in" filter="fade">
                                       <p:cBhvr>
                                         <p:cTn id="13" dur="1"/>
-                                        <p:tgtEl>
-                                          <p:spTgt spid="298"/>
-                                        </p:tgtEl>
-                                      </p:cBhvr>
-                                    </p:animEffect>
-                                  </p:childTnLst>
-                                </p:cTn>
-                              </p:par>
-                              <p:par>
-                                <p:cTn id="14" presetID="10" presetClass="entr" presetSubtype="0" fill="hold" nodeType="withEffect">
-                                  <p:stCondLst>
-                                    <p:cond delay="0"/>
-                                  </p:stCondLst>
-                                  <p:childTnLst>
-                                    <p:set>
-                                      <p:cBhvr>
-                                        <p:cTn id="15" dur="1" fill="hold">
-                                          <p:stCondLst>
-                                            <p:cond delay="0"/>
-                                          </p:stCondLst>
-                                        </p:cTn>
-                                        <p:tgtEl>
-                                          <p:spTgt spid="299"/>
-                                        </p:tgtEl>
-                                        <p:attrNameLst>
-                                          <p:attrName>style.visibility</p:attrName>
-                                        </p:attrNameLst>
-                                      </p:cBhvr>
-                                      <p:to>
-                                        <p:strVal val="visible"/>
-                                      </p:to>
-                                    </p:set>
-                                    <p:animEffect transition="in" filter="fade">
-                                      <p:cBhvr>
-                                        <p:cTn id="16" dur="1"/>
                                         <p:tgtEl>
                                           <p:spTgt spid="299"/>
                                         </p:tgtEl>

</xml_diff>

<commit_message>
Final presentation: Minor picture placement corrections
</commit_message>
<xml_diff>
--- a/Final Presentation.pptx
+++ b/Final Presentation.pptx
@@ -18657,7 +18657,7 @@
         </p:blipFill>
         <p:spPr>
           <a:xfrm>
-            <a:off x="228600" y="1843225"/>
+            <a:off x="237478" y="1843225"/>
             <a:ext cx="8528120" cy="4360726"/>
           </a:xfrm>
           <a:prstGeom prst="rect">
@@ -18794,7 +18794,7 @@
         </p:blipFill>
         <p:spPr>
           <a:xfrm>
-            <a:off x="152400" y="1843225"/>
+            <a:off x="196790" y="1843225"/>
             <a:ext cx="8588268" cy="4360726"/>
           </a:xfrm>
           <a:prstGeom prst="rect">
@@ -18963,7 +18963,7 @@
         </p:blipFill>
         <p:spPr>
           <a:xfrm>
-            <a:off x="200336" y="1702600"/>
+            <a:off x="235848" y="1835770"/>
             <a:ext cx="8539438" cy="4368712"/>
           </a:xfrm>
           <a:prstGeom prst="rect">
@@ -19021,7 +19021,7 @@
         </p:nvSpPr>
         <p:spPr>
           <a:xfrm>
-            <a:off x="7014175" y="640975"/>
+            <a:off x="7023053" y="649853"/>
             <a:ext cx="1725600" cy="748200"/>
           </a:xfrm>
           <a:prstGeom prst="rect">
@@ -19200,7 +19200,7 @@
         </p:nvSpPr>
         <p:spPr>
           <a:xfrm>
-            <a:off x="7014175" y="640975"/>
+            <a:off x="7023053" y="649853"/>
             <a:ext cx="1725600" cy="748200"/>
           </a:xfrm>
           <a:prstGeom prst="rect">
@@ -19278,7 +19278,7 @@
         </p:blipFill>
         <p:spPr>
           <a:xfrm>
-            <a:off x="228600" y="1690825"/>
+            <a:off x="246356" y="1841751"/>
             <a:ext cx="8523819" cy="4360724"/>
           </a:xfrm>
           <a:prstGeom prst="rect">

</xml_diff>

<commit_message>
Final presentation: Exchanged O notations with formulas
</commit_message>
<xml_diff>
--- a/Final Presentation.pptx
+++ b/Final Presentation.pptx
@@ -18526,7 +18526,10 @@
               <a:buNone/>
             </a:pPr>
             <a:r>
-              <a:rPr lang="en-US"/>
+              <a:rPr lang="en-US" dirty="0">
+                <a:latin typeface="Calibri" panose="020F0502020204030204" pitchFamily="34" charset="0"/>
+                <a:cs typeface="Calibri" panose="020F0502020204030204" pitchFamily="34" charset="0"/>
+              </a:rPr>
               <a:t>baseline for speedup</a:t>
             </a:r>
           </a:p>
@@ -19516,6 +19519,8 @@
                 <a:solidFill>
                   <a:srgbClr val="666666"/>
                 </a:solidFill>
+                <a:latin typeface="Calibri" panose="020F0502020204030204" pitchFamily="34" charset="0"/>
+                <a:cs typeface="Calibri" panose="020F0502020204030204" pitchFamily="34" charset="0"/>
               </a:rPr>
               <a:t>[1] Azad et al: A parallel tree grafting algorithm for maximum cardinality matching in bipartite graphs.</a:t>
             </a:r>
@@ -19721,6 +19726,8 @@
                     <a:lumMod val="50000"/>
                   </a:schemeClr>
                 </a:solidFill>
+                <a:latin typeface="Calibri" panose="020F0502020204030204" pitchFamily="34" charset="0"/>
+                <a:cs typeface="Calibri" panose="020F0502020204030204" pitchFamily="34" charset="0"/>
               </a:rPr>
               <a:t>Image source: http://lemon.cs.elte.hu/pub/doc/latest-svn/bipartite_matching.png</a:t>
             </a:r>
@@ -20418,102 +20425,183 @@
           </a:p>
         </p:txBody>
       </p:sp>
-      <p:sp>
-        <p:nvSpPr>
-          <p:cNvPr id="175" name="Shape 175"/>
-          <p:cNvSpPr txBox="1">
-            <a:spLocks noGrp="1"/>
-          </p:cNvSpPr>
-          <p:nvPr>
-            <p:ph type="body" idx="2"/>
-          </p:nvPr>
-        </p:nvSpPr>
-        <p:spPr>
-          <a:xfrm>
-            <a:off x="4825675" y="1690812"/>
-            <a:ext cx="3886200" cy="4351200"/>
-          </a:xfrm>
-          <a:prstGeom prst="rect">
-            <a:avLst/>
-          </a:prstGeom>
-        </p:spPr>
-        <p:txBody>
-          <a:bodyPr lIns="91425" tIns="91425" rIns="91425" bIns="91425" anchor="t" anchorCtr="0">
-            <a:noAutofit/>
-          </a:bodyPr>
-          <a:lstStyle/>
-          <a:p>
-            <a:pPr marL="457200" lvl="0" indent="-228600" rtl="0">
-              <a:spcBef>
-                <a:spcPts val="0"/>
-              </a:spcBef>
-              <a:spcAft>
-                <a:spcPts val="1200"/>
-              </a:spcAft>
-            </a:pPr>
-            <a:r>
-              <a:rPr lang="en-US" dirty="0"/>
-              <a:t>Start with initial matching</a:t>
-            </a:r>
-          </a:p>
-          <a:p>
-            <a:pPr marL="457200" lvl="0" indent="-228600" rtl="0">
-              <a:spcBef>
-                <a:spcPts val="0"/>
-              </a:spcBef>
-              <a:spcAft>
-                <a:spcPts val="1200"/>
-              </a:spcAft>
-            </a:pPr>
-            <a:r>
-              <a:rPr lang="en-US" dirty="0"/>
-              <a:t>Find augmenting paths</a:t>
-            </a:r>
-          </a:p>
-          <a:p>
-            <a:pPr marL="457200" lvl="0" indent="-228600" rtl="0">
-              <a:spcBef>
-                <a:spcPts val="0"/>
-              </a:spcBef>
-              <a:spcAft>
-                <a:spcPts val="1200"/>
-              </a:spcAft>
-            </a:pPr>
-            <a:r>
-              <a:rPr lang="en-US" dirty="0"/>
-              <a:t>DFS from each unmatched node</a:t>
-            </a:r>
-          </a:p>
-          <a:p>
-            <a:pPr marL="457200" lvl="0" indent="-228600" rtl="0">
-              <a:spcBef>
-                <a:spcPts val="0"/>
-              </a:spcBef>
-              <a:spcAft>
-                <a:spcPts val="1200"/>
-              </a:spcAft>
-            </a:pPr>
-            <a:r>
-              <a:rPr lang="en-US" dirty="0"/>
-              <a:t>Stack based DFS implementation</a:t>
-            </a:r>
-          </a:p>
-          <a:p>
-            <a:pPr marL="457200" lvl="0" indent="-228600">
-              <a:spcBef>
-                <a:spcPts val="0"/>
-              </a:spcBef>
-              <a:spcAft>
-                <a:spcPts val="1200"/>
-              </a:spcAft>
-            </a:pPr>
-            <a:r>
-              <a:rPr lang="en-US" dirty="0"/>
-              <a:t>O(m*n)</a:t>
-            </a:r>
-          </a:p>
-        </p:txBody>
-      </p:sp>
+      <mc:AlternateContent xmlns:mc="http://schemas.openxmlformats.org/markup-compatibility/2006">
+        <mc:Choice xmlns:a14="http://schemas.microsoft.com/office/drawing/2010/main" Requires="a14">
+          <p:sp>
+            <p:nvSpPr>
+              <p:cNvPr id="175" name="Shape 175"/>
+              <p:cNvSpPr txBox="1">
+                <a:spLocks noGrp="1"/>
+              </p:cNvSpPr>
+              <p:nvPr>
+                <p:ph type="body" idx="2"/>
+              </p:nvPr>
+            </p:nvSpPr>
+            <p:spPr>
+              <a:xfrm>
+                <a:off x="4825675" y="1690812"/>
+                <a:ext cx="3886200" cy="4351200"/>
+              </a:xfrm>
+              <a:prstGeom prst="rect">
+                <a:avLst/>
+              </a:prstGeom>
+            </p:spPr>
+            <p:txBody>
+              <a:bodyPr lIns="91425" tIns="91425" rIns="91425" bIns="91425" anchor="t" anchorCtr="0">
+                <a:noAutofit/>
+              </a:bodyPr>
+              <a:lstStyle/>
+              <a:p>
+                <a:pPr marL="457200" lvl="0" indent="-228600" rtl="0">
+                  <a:spcBef>
+                    <a:spcPts val="0"/>
+                  </a:spcBef>
+                  <a:spcAft>
+                    <a:spcPts val="1200"/>
+                  </a:spcAft>
+                </a:pPr>
+                <a:r>
+                  <a:rPr lang="en-US" dirty="0"/>
+                  <a:t>Start with initial matching</a:t>
+                </a:r>
+              </a:p>
+              <a:p>
+                <a:pPr marL="457200" lvl="0" indent="-228600" rtl="0">
+                  <a:spcBef>
+                    <a:spcPts val="0"/>
+                  </a:spcBef>
+                  <a:spcAft>
+                    <a:spcPts val="1200"/>
+                  </a:spcAft>
+                </a:pPr>
+                <a:r>
+                  <a:rPr lang="en-US" dirty="0"/>
+                  <a:t>Find augmenting paths</a:t>
+                </a:r>
+              </a:p>
+              <a:p>
+                <a:pPr marL="457200" lvl="0" indent="-228600" rtl="0">
+                  <a:spcBef>
+                    <a:spcPts val="0"/>
+                  </a:spcBef>
+                  <a:spcAft>
+                    <a:spcPts val="1200"/>
+                  </a:spcAft>
+                </a:pPr>
+                <a:r>
+                  <a:rPr lang="en-US" dirty="0"/>
+                  <a:t>DFS from each unmatched node</a:t>
+                </a:r>
+              </a:p>
+              <a:p>
+                <a:pPr marL="457200" lvl="0" indent="-228600" rtl="0">
+                  <a:spcBef>
+                    <a:spcPts val="0"/>
+                  </a:spcBef>
+                  <a:spcAft>
+                    <a:spcPts val="1200"/>
+                  </a:spcAft>
+                </a:pPr>
+                <a:r>
+                  <a:rPr lang="en-US" dirty="0"/>
+                  <a:t>Stack based DFS implementation</a:t>
+                </a:r>
+              </a:p>
+              <a:p>
+                <a:pPr marL="457200" lvl="0" indent="-228600">
+                  <a:spcBef>
+                    <a:spcPts val="0"/>
+                  </a:spcBef>
+                  <a:spcAft>
+                    <a:spcPts val="1200"/>
+                  </a:spcAft>
+                </a:pPr>
+                <a14:m>
+                  <m:oMath xmlns:m="http://schemas.openxmlformats.org/officeDocument/2006/math">
+                    <m:r>
+                      <a:rPr lang="en-US" i="1" dirty="0" smtClean="0">
+                        <a:latin typeface="Cambria Math" panose="02040503050406030204" pitchFamily="18" charset="0"/>
+                      </a:rPr>
+                      <m:t>𝑂</m:t>
+                    </m:r>
+                    <m:r>
+                      <a:rPr lang="en-US" i="1" dirty="0" smtClean="0">
+                        <a:latin typeface="Cambria Math" panose="02040503050406030204" pitchFamily="18" charset="0"/>
+                      </a:rPr>
+                      <m:t>(</m:t>
+                    </m:r>
+                    <m:r>
+                      <a:rPr lang="en-US" i="1" dirty="0" smtClean="0">
+                        <a:latin typeface="Cambria Math" panose="02040503050406030204" pitchFamily="18" charset="0"/>
+                      </a:rPr>
+                      <m:t>𝑚</m:t>
+                    </m:r>
+                    <m:r>
+                      <a:rPr lang="en-US" i="1" dirty="0" smtClean="0">
+                        <a:latin typeface="Cambria Math" panose="02040503050406030204" pitchFamily="18" charset="0"/>
+                      </a:rPr>
+                      <m:t>∗</m:t>
+                    </m:r>
+                    <m:r>
+                      <a:rPr lang="en-US" i="1" dirty="0" smtClean="0">
+                        <a:latin typeface="Cambria Math" panose="02040503050406030204" pitchFamily="18" charset="0"/>
+                      </a:rPr>
+                      <m:t>𝑛</m:t>
+                    </m:r>
+                    <m:r>
+                      <a:rPr lang="en-US" i="1" dirty="0" smtClean="0">
+                        <a:latin typeface="Cambria Math" panose="02040503050406030204" pitchFamily="18" charset="0"/>
+                      </a:rPr>
+                      <m:t>)</m:t>
+                    </m:r>
+                  </m:oMath>
+                </a14:m>
+                <a:endParaRPr lang="en-US" dirty="0"/>
+              </a:p>
+            </p:txBody>
+          </p:sp>
+        </mc:Choice>
+        <mc:Fallback>
+          <p:sp>
+            <p:nvSpPr>
+              <p:cNvPr id="175" name="Shape 175"/>
+              <p:cNvSpPr txBox="1">
+                <a:spLocks noGrp="1" noRot="1" noChangeAspect="1" noMove="1" noResize="1" noEditPoints="1" noAdjustHandles="1" noChangeArrowheads="1" noChangeShapeType="1" noTextEdit="1"/>
+              </p:cNvSpPr>
+              <p:nvPr>
+                <p:ph type="body" idx="2"/>
+              </p:nvPr>
+            </p:nvSpPr>
+            <p:spPr>
+              <a:xfrm>
+                <a:off x="4825675" y="1690812"/>
+                <a:ext cx="3886200" cy="4351200"/>
+              </a:xfrm>
+              <a:prstGeom prst="rect">
+                <a:avLst/>
+              </a:prstGeom>
+              <a:blipFill>
+                <a:blip r:embed="rId3"/>
+                <a:stretch>
+                  <a:fillRect t="-1261"/>
+                </a:stretch>
+              </a:blipFill>
+            </p:spPr>
+            <p:txBody>
+              <a:bodyPr/>
+              <a:lstStyle/>
+              <a:p>
+                <a:r>
+                  <a:rPr lang="en-US">
+                    <a:noFill/>
+                  </a:rPr>
+                  <a:t> </a:t>
+                </a:r>
+              </a:p>
+            </p:txBody>
+          </p:sp>
+        </mc:Fallback>
+      </mc:AlternateContent>
       <p:sp>
         <p:nvSpPr>
           <p:cNvPr id="176" name="Shape 176"/>
@@ -21282,7 +21370,10 @@
               <a:buNone/>
             </a:pPr>
             <a:r>
-              <a:rPr lang="en-US"/>
+              <a:rPr lang="en-US" dirty="0">
+                <a:latin typeface="Calibri" panose="020F0502020204030204" pitchFamily="34" charset="0"/>
+                <a:cs typeface="Calibri" panose="020F0502020204030204" pitchFamily="34" charset="0"/>
+              </a:rPr>
               <a:t>unmatched nodes</a:t>
             </a:r>
           </a:p>
@@ -22535,7 +22626,10 @@
               <a:buNone/>
             </a:pPr>
             <a:r>
-              <a:rPr lang="en-US"/>
+              <a:rPr lang="en-US" dirty="0">
+                <a:latin typeface="Calibri" panose="020F0502020204030204" pitchFamily="34" charset="0"/>
+                <a:cs typeface="Calibri" panose="020F0502020204030204" pitchFamily="34" charset="0"/>
+              </a:rPr>
               <a:t>unmatched nodes</a:t>
             </a:r>
           </a:p>
@@ -23968,6 +24062,8 @@
                     <a:lumMod val="50000"/>
                   </a:schemeClr>
                 </a:solidFill>
+                <a:latin typeface="Calibri" panose="020F0502020204030204" pitchFamily="34" charset="0"/>
+                <a:cs typeface="Calibri" panose="020F0502020204030204" pitchFamily="34" charset="0"/>
               </a:rPr>
               <a:t>Image source: http://hips.seas.harvard.edu/files/xeon-phi.jpg</a:t>
             </a:r>
@@ -24009,13 +24105,13 @@
           <p:nvPr>
             <p:extLst>
               <p:ext uri="{D42A27DB-BD31-4B8C-83A1-F6EECF244321}">
-                <p14:modId xmlns:p14="http://schemas.microsoft.com/office/powerpoint/2010/main" val="1178437887"/>
+                <p14:modId xmlns:p14="http://schemas.microsoft.com/office/powerpoint/2010/main" val="942374614"/>
               </p:ext>
             </p:extLst>
           </p:nvPr>
         </p:nvGraphicFramePr>
         <p:xfrm>
-          <a:off x="2004300" y="3867247"/>
+          <a:off x="2004300" y="3833379"/>
           <a:ext cx="5592600" cy="2401350"/>
         </p:xfrm>
         <a:graphic>
@@ -25710,92 +25806,274 @@
               <a:buNone/>
             </a:pPr>
             <a:r>
-              <a:rPr lang="en-US"/>
+              <a:rPr lang="en-US" dirty="0"/>
               <a:t>Worst Case</a:t>
             </a:r>
           </a:p>
         </p:txBody>
       </p:sp>
-      <p:sp>
-        <p:nvSpPr>
-          <p:cNvPr id="298" name="Shape 298"/>
-          <p:cNvSpPr txBox="1"/>
-          <p:nvPr/>
-        </p:nvSpPr>
-        <p:spPr>
-          <a:xfrm>
-            <a:off x="6802500" y="2741887"/>
-            <a:ext cx="1881600" cy="2783400"/>
-          </a:xfrm>
-          <a:prstGeom prst="rect">
-            <a:avLst/>
-          </a:prstGeom>
-          <a:noFill/>
-          <a:ln>
-            <a:noFill/>
-          </a:ln>
-        </p:spPr>
-        <p:txBody>
-          <a:bodyPr lIns="91425" tIns="91425" rIns="91425" bIns="91425" anchor="t" anchorCtr="0">
-            <a:noAutofit/>
-          </a:bodyPr>
-          <a:lstStyle/>
-          <a:p>
-            <a:pPr lvl="0">
-              <a:spcBef>
-                <a:spcPts val="0"/>
-              </a:spcBef>
-              <a:buNone/>
-            </a:pPr>
-            <a:r>
-              <a:rPr lang="en-US" sz="1800"/>
-              <a:t>W = O(m*n)</a:t>
-            </a:r>
-          </a:p>
-          <a:p>
-            <a:pPr lvl="0">
-              <a:spcBef>
-                <a:spcPts val="0"/>
-              </a:spcBef>
-              <a:buNone/>
-            </a:pPr>
-            <a:endParaRPr sz="1800"/>
-          </a:p>
-          <a:p>
-            <a:pPr lvl="0">
-              <a:spcBef>
-                <a:spcPts val="0"/>
-              </a:spcBef>
-              <a:buNone/>
-            </a:pPr>
-            <a:r>
-              <a:rPr lang="en-US" sz="1800"/>
-              <a:t>D = O(m*n)</a:t>
-            </a:r>
-          </a:p>
-          <a:p>
-            <a:pPr lvl="0">
-              <a:spcBef>
-                <a:spcPts val="0"/>
-              </a:spcBef>
-              <a:buNone/>
-            </a:pPr>
-            <a:endParaRPr sz="1800"/>
-          </a:p>
-          <a:p>
-            <a:pPr lvl="0">
-              <a:spcBef>
-                <a:spcPts val="0"/>
-              </a:spcBef>
-              <a:buNone/>
-            </a:pPr>
-            <a:r>
-              <a:rPr lang="en-US" sz="1800"/>
-              <a:t>avg. par. = O(1)</a:t>
-            </a:r>
-          </a:p>
-        </p:txBody>
-      </p:sp>
+      <mc:AlternateContent xmlns:mc="http://schemas.openxmlformats.org/markup-compatibility/2006" xmlns:a14="http://schemas.microsoft.com/office/drawing/2010/main">
+        <mc:Choice Requires="a14">
+          <p:sp>
+            <p:nvSpPr>
+              <p:cNvPr id="298" name="Shape 298"/>
+              <p:cNvSpPr txBox="1"/>
+              <p:nvPr/>
+            </p:nvSpPr>
+            <p:spPr>
+              <a:xfrm>
+                <a:off x="6802500" y="2741887"/>
+                <a:ext cx="1881600" cy="2783400"/>
+              </a:xfrm>
+              <a:prstGeom prst="rect">
+                <a:avLst/>
+              </a:prstGeom>
+              <a:noFill/>
+              <a:ln>
+                <a:noFill/>
+              </a:ln>
+            </p:spPr>
+            <p:txBody>
+              <a:bodyPr lIns="91425" tIns="91425" rIns="91425" bIns="91425" anchor="t" anchorCtr="0">
+                <a:noAutofit/>
+              </a:bodyPr>
+              <a:lstStyle/>
+              <a:p>
+                <a:pPr lvl="0">
+                  <a:spcBef>
+                    <a:spcPts val="0"/>
+                  </a:spcBef>
+                  <a:buNone/>
+                </a:pPr>
+                <a:r>
+                  <a:rPr lang="en-US" sz="1800" dirty="0">
+                    <a:latin typeface="Calibri" panose="020F0502020204030204" pitchFamily="34" charset="0"/>
+                    <a:cs typeface="Calibri" panose="020F0502020204030204" pitchFamily="34" charset="0"/>
+                  </a:rPr>
+                  <a:t>W = </a:t>
+                </a:r>
+                <a14:m>
+                  <m:oMath xmlns:m="http://schemas.openxmlformats.org/officeDocument/2006/math">
+                    <m:r>
+                      <a:rPr lang="en-US" sz="1800" i="1" dirty="0" smtClean="0">
+                        <a:latin typeface="Cambria Math" panose="02040503050406030204" pitchFamily="18" charset="0"/>
+                        <a:cs typeface="Calibri" panose="020F0502020204030204" pitchFamily="34" charset="0"/>
+                      </a:rPr>
+                      <m:t>𝑂</m:t>
+                    </m:r>
+                    <m:r>
+                      <a:rPr lang="en-US" sz="1800" i="1" dirty="0" smtClean="0">
+                        <a:latin typeface="Cambria Math" panose="02040503050406030204" pitchFamily="18" charset="0"/>
+                        <a:cs typeface="Calibri" panose="020F0502020204030204" pitchFamily="34" charset="0"/>
+                      </a:rPr>
+                      <m:t>(</m:t>
+                    </m:r>
+                    <m:r>
+                      <a:rPr lang="en-US" sz="1800" i="1" dirty="0" smtClean="0">
+                        <a:latin typeface="Cambria Math" panose="02040503050406030204" pitchFamily="18" charset="0"/>
+                        <a:cs typeface="Calibri" panose="020F0502020204030204" pitchFamily="34" charset="0"/>
+                      </a:rPr>
+                      <m:t>𝑚</m:t>
+                    </m:r>
+                    <m:r>
+                      <a:rPr lang="en-US" sz="1800" i="1" dirty="0" smtClean="0">
+                        <a:latin typeface="Cambria Math" panose="02040503050406030204" pitchFamily="18" charset="0"/>
+                        <a:cs typeface="Calibri" panose="020F0502020204030204" pitchFamily="34" charset="0"/>
+                      </a:rPr>
+                      <m:t>∗</m:t>
+                    </m:r>
+                    <m:r>
+                      <a:rPr lang="en-US" sz="1800" i="1" dirty="0" smtClean="0">
+                        <a:latin typeface="Cambria Math" panose="02040503050406030204" pitchFamily="18" charset="0"/>
+                        <a:cs typeface="Calibri" panose="020F0502020204030204" pitchFamily="34" charset="0"/>
+                      </a:rPr>
+                      <m:t>𝑛</m:t>
+                    </m:r>
+                    <m:r>
+                      <a:rPr lang="en-US" sz="1800" i="1" dirty="0" smtClean="0">
+                        <a:latin typeface="Cambria Math" panose="02040503050406030204" pitchFamily="18" charset="0"/>
+                        <a:cs typeface="Calibri" panose="020F0502020204030204" pitchFamily="34" charset="0"/>
+                      </a:rPr>
+                      <m:t>)</m:t>
+                    </m:r>
+                  </m:oMath>
+                </a14:m>
+                <a:endParaRPr lang="en-US" sz="1800" dirty="0">
+                  <a:latin typeface="Calibri" panose="020F0502020204030204" pitchFamily="34" charset="0"/>
+                  <a:cs typeface="Calibri" panose="020F0502020204030204" pitchFamily="34" charset="0"/>
+                </a:endParaRPr>
+              </a:p>
+              <a:p>
+                <a:pPr lvl="0">
+                  <a:spcBef>
+                    <a:spcPts val="0"/>
+                  </a:spcBef>
+                  <a:buNone/>
+                </a:pPr>
+                <a:endParaRPr sz="1800" dirty="0">
+                  <a:latin typeface="Calibri" panose="020F0502020204030204" pitchFamily="34" charset="0"/>
+                  <a:cs typeface="Calibri" panose="020F0502020204030204" pitchFamily="34" charset="0"/>
+                </a:endParaRPr>
+              </a:p>
+              <a:p>
+                <a:pPr lvl="0">
+                  <a:spcBef>
+                    <a:spcPts val="0"/>
+                  </a:spcBef>
+                  <a:buNone/>
+                </a:pPr>
+                <a:r>
+                  <a:rPr lang="en-US" sz="1800" dirty="0">
+                    <a:latin typeface="Calibri" panose="020F0502020204030204" pitchFamily="34" charset="0"/>
+                    <a:cs typeface="Calibri" panose="020F0502020204030204" pitchFamily="34" charset="0"/>
+                  </a:rPr>
+                  <a:t>D = </a:t>
+                </a:r>
+                <a14:m>
+                  <m:oMath xmlns:m="http://schemas.openxmlformats.org/officeDocument/2006/math">
+                    <m:r>
+                      <a:rPr lang="en-US" sz="1800" i="1" dirty="0" smtClean="0">
+                        <a:latin typeface="Cambria Math" panose="02040503050406030204" pitchFamily="18" charset="0"/>
+                        <a:cs typeface="Calibri" panose="020F0502020204030204" pitchFamily="34" charset="0"/>
+                      </a:rPr>
+                      <m:t>𝑂</m:t>
+                    </m:r>
+                    <m:r>
+                      <a:rPr lang="en-US" sz="1800" i="1" dirty="0" smtClean="0">
+                        <a:latin typeface="Cambria Math" panose="02040503050406030204" pitchFamily="18" charset="0"/>
+                        <a:cs typeface="Calibri" panose="020F0502020204030204" pitchFamily="34" charset="0"/>
+                      </a:rPr>
+                      <m:t>(</m:t>
+                    </m:r>
+                    <m:r>
+                      <a:rPr lang="en-US" sz="1800" i="1" dirty="0" smtClean="0">
+                        <a:latin typeface="Cambria Math" panose="02040503050406030204" pitchFamily="18" charset="0"/>
+                        <a:cs typeface="Calibri" panose="020F0502020204030204" pitchFamily="34" charset="0"/>
+                      </a:rPr>
+                      <m:t>𝑚</m:t>
+                    </m:r>
+                    <m:r>
+                      <a:rPr lang="en-US" sz="1800" i="1" dirty="0" smtClean="0">
+                        <a:latin typeface="Cambria Math" panose="02040503050406030204" pitchFamily="18" charset="0"/>
+                        <a:cs typeface="Calibri" panose="020F0502020204030204" pitchFamily="34" charset="0"/>
+                      </a:rPr>
+                      <m:t>∗</m:t>
+                    </m:r>
+                    <m:r>
+                      <a:rPr lang="en-US" sz="1800" i="1" dirty="0" smtClean="0">
+                        <a:latin typeface="Cambria Math" panose="02040503050406030204" pitchFamily="18" charset="0"/>
+                        <a:cs typeface="Calibri" panose="020F0502020204030204" pitchFamily="34" charset="0"/>
+                      </a:rPr>
+                      <m:t>𝑛</m:t>
+                    </m:r>
+                    <m:r>
+                      <a:rPr lang="en-US" sz="1800" i="1" dirty="0" smtClean="0">
+                        <a:latin typeface="Cambria Math" panose="02040503050406030204" pitchFamily="18" charset="0"/>
+                        <a:cs typeface="Calibri" panose="020F0502020204030204" pitchFamily="34" charset="0"/>
+                      </a:rPr>
+                      <m:t>)</m:t>
+                    </m:r>
+                  </m:oMath>
+                </a14:m>
+                <a:endParaRPr lang="en-US" sz="1800" dirty="0">
+                  <a:latin typeface="Calibri" panose="020F0502020204030204" pitchFamily="34" charset="0"/>
+                  <a:cs typeface="Calibri" panose="020F0502020204030204" pitchFamily="34" charset="0"/>
+                </a:endParaRPr>
+              </a:p>
+              <a:p>
+                <a:pPr lvl="0">
+                  <a:spcBef>
+                    <a:spcPts val="0"/>
+                  </a:spcBef>
+                  <a:buNone/>
+                </a:pPr>
+                <a:endParaRPr sz="1800" dirty="0">
+                  <a:latin typeface="Calibri" panose="020F0502020204030204" pitchFamily="34" charset="0"/>
+                  <a:cs typeface="Calibri" panose="020F0502020204030204" pitchFamily="34" charset="0"/>
+                </a:endParaRPr>
+              </a:p>
+              <a:p>
+                <a:pPr lvl="0">
+                  <a:spcBef>
+                    <a:spcPts val="0"/>
+                  </a:spcBef>
+                  <a:buNone/>
+                </a:pPr>
+                <a:r>
+                  <a:rPr lang="en-US" sz="1800" dirty="0">
+                    <a:latin typeface="Calibri" panose="020F0502020204030204" pitchFamily="34" charset="0"/>
+                    <a:cs typeface="Calibri" panose="020F0502020204030204" pitchFamily="34" charset="0"/>
+                  </a:rPr>
+                  <a:t>avg. par. = </a:t>
+                </a:r>
+                <a14:m>
+                  <m:oMath xmlns:m="http://schemas.openxmlformats.org/officeDocument/2006/math">
+                    <m:r>
+                      <a:rPr lang="en-US" sz="1800" i="1" dirty="0" smtClean="0">
+                        <a:latin typeface="Cambria Math" panose="02040503050406030204" pitchFamily="18" charset="0"/>
+                        <a:cs typeface="Calibri" panose="020F0502020204030204" pitchFamily="34" charset="0"/>
+                      </a:rPr>
+                      <m:t>𝑂</m:t>
+                    </m:r>
+                    <m:r>
+                      <a:rPr lang="en-US" sz="1800" i="1" dirty="0" smtClean="0">
+                        <a:latin typeface="Cambria Math" panose="02040503050406030204" pitchFamily="18" charset="0"/>
+                        <a:cs typeface="Calibri" panose="020F0502020204030204" pitchFamily="34" charset="0"/>
+                      </a:rPr>
+                      <m:t>(1)</m:t>
+                    </m:r>
+                  </m:oMath>
+                </a14:m>
+                <a:endParaRPr lang="en-US" sz="1800" dirty="0">
+                  <a:latin typeface="Calibri" panose="020F0502020204030204" pitchFamily="34" charset="0"/>
+                  <a:cs typeface="Calibri" panose="020F0502020204030204" pitchFamily="34" charset="0"/>
+                </a:endParaRPr>
+              </a:p>
+            </p:txBody>
+          </p:sp>
+        </mc:Choice>
+        <mc:Fallback xmlns="">
+          <p:sp>
+            <p:nvSpPr>
+              <p:cNvPr id="298" name="Shape 298"/>
+              <p:cNvSpPr txBox="1">
+                <a:spLocks noRot="1" noChangeAspect="1" noMove="1" noResize="1" noEditPoints="1" noAdjustHandles="1" noChangeArrowheads="1" noChangeShapeType="1" noTextEdit="1"/>
+              </p:cNvSpPr>
+              <p:nvPr/>
+            </p:nvSpPr>
+            <p:spPr>
+              <a:xfrm>
+                <a:off x="6802500" y="2741887"/>
+                <a:ext cx="1881600" cy="2783400"/>
+              </a:xfrm>
+              <a:prstGeom prst="rect">
+                <a:avLst/>
+              </a:prstGeom>
+              <a:blipFill>
+                <a:blip r:embed="rId3"/>
+                <a:stretch>
+                  <a:fillRect l="-2913"/>
+                </a:stretch>
+              </a:blipFill>
+              <a:ln>
+                <a:noFill/>
+              </a:ln>
+            </p:spPr>
+            <p:txBody>
+              <a:bodyPr/>
+              <a:lstStyle/>
+              <a:p>
+                <a:r>
+                  <a:rPr lang="en-US">
+                    <a:noFill/>
+                  </a:rPr>
+                  <a:t> </a:t>
+                </a:r>
+              </a:p>
+            </p:txBody>
+          </p:sp>
+        </mc:Fallback>
+      </mc:AlternateContent>
       <p:grpSp>
         <p:nvGrpSpPr>
           <p:cNvPr id="299" name="Shape 299"/>
@@ -27188,86 +27466,268 @@
           </p:txBody>
         </p:sp>
       </p:grpSp>
-      <p:sp>
-        <p:nvSpPr>
-          <p:cNvPr id="339" name="Shape 339"/>
-          <p:cNvSpPr txBox="1"/>
-          <p:nvPr/>
-        </p:nvSpPr>
-        <p:spPr>
-          <a:xfrm>
-            <a:off x="2326750" y="2774025"/>
-            <a:ext cx="1881600" cy="2783400"/>
-          </a:xfrm>
-          <a:prstGeom prst="rect">
-            <a:avLst/>
-          </a:prstGeom>
-          <a:noFill/>
-          <a:ln>
-            <a:noFill/>
-          </a:ln>
-        </p:spPr>
-        <p:txBody>
-          <a:bodyPr lIns="91425" tIns="91425" rIns="91425" bIns="91425" anchor="t" anchorCtr="0">
-            <a:noAutofit/>
-          </a:bodyPr>
-          <a:lstStyle/>
-          <a:p>
-            <a:pPr lvl="0" rtl="0">
-              <a:spcBef>
-                <a:spcPts val="0"/>
-              </a:spcBef>
-              <a:buNone/>
-            </a:pPr>
-            <a:r>
-              <a:rPr lang="en-US" sz="1800"/>
-              <a:t>W = O(m*n)</a:t>
-            </a:r>
-          </a:p>
-          <a:p>
-            <a:pPr lvl="0" rtl="0">
-              <a:spcBef>
-                <a:spcPts val="0"/>
-              </a:spcBef>
-              <a:buNone/>
-            </a:pPr>
-            <a:endParaRPr sz="1800"/>
-          </a:p>
-          <a:p>
-            <a:pPr lvl="0" rtl="0">
-              <a:spcBef>
-                <a:spcPts val="0"/>
-              </a:spcBef>
-              <a:buNone/>
-            </a:pPr>
-            <a:r>
-              <a:rPr lang="en-US" sz="1800"/>
-              <a:t>D = O(m)</a:t>
-            </a:r>
-          </a:p>
-          <a:p>
-            <a:pPr lvl="0" rtl="0">
-              <a:spcBef>
-                <a:spcPts val="0"/>
-              </a:spcBef>
-              <a:buNone/>
-            </a:pPr>
-            <a:endParaRPr sz="1800"/>
-          </a:p>
-          <a:p>
-            <a:pPr lvl="0" rtl="0">
-              <a:spcBef>
-                <a:spcPts val="0"/>
-              </a:spcBef>
-              <a:buNone/>
-            </a:pPr>
-            <a:r>
-              <a:rPr lang="en-US" sz="1800"/>
-              <a:t>avg. par. = O(n)</a:t>
-            </a:r>
-          </a:p>
-        </p:txBody>
-      </p:sp>
+      <mc:AlternateContent xmlns:mc="http://schemas.openxmlformats.org/markup-compatibility/2006" xmlns:a14="http://schemas.microsoft.com/office/drawing/2010/main">
+        <mc:Choice Requires="a14">
+          <p:sp>
+            <p:nvSpPr>
+              <p:cNvPr id="339" name="Shape 339"/>
+              <p:cNvSpPr txBox="1"/>
+              <p:nvPr/>
+            </p:nvSpPr>
+            <p:spPr>
+              <a:xfrm>
+                <a:off x="2326750" y="2774025"/>
+                <a:ext cx="1881600" cy="2783400"/>
+              </a:xfrm>
+              <a:prstGeom prst="rect">
+                <a:avLst/>
+              </a:prstGeom>
+              <a:noFill/>
+              <a:ln>
+                <a:noFill/>
+              </a:ln>
+            </p:spPr>
+            <p:txBody>
+              <a:bodyPr lIns="91425" tIns="91425" rIns="91425" bIns="91425" anchor="t" anchorCtr="0">
+                <a:noAutofit/>
+              </a:bodyPr>
+              <a:lstStyle/>
+              <a:p>
+                <a:pPr lvl="0" rtl="0">
+                  <a:spcBef>
+                    <a:spcPts val="0"/>
+                  </a:spcBef>
+                  <a:buNone/>
+                </a:pPr>
+                <a:r>
+                  <a:rPr lang="en-US" sz="1800" dirty="0">
+                    <a:latin typeface="Calibri" panose="020F0502020204030204" pitchFamily="34" charset="0"/>
+                    <a:cs typeface="Calibri" panose="020F0502020204030204" pitchFamily="34" charset="0"/>
+                  </a:rPr>
+                  <a:t>W = </a:t>
+                </a:r>
+                <a14:m>
+                  <m:oMath xmlns:m="http://schemas.openxmlformats.org/officeDocument/2006/math">
+                    <m:r>
+                      <a:rPr lang="en-US" sz="1800" i="1" dirty="0" smtClean="0">
+                        <a:latin typeface="Cambria Math" panose="02040503050406030204" pitchFamily="18" charset="0"/>
+                        <a:cs typeface="Calibri" panose="020F0502020204030204" pitchFamily="34" charset="0"/>
+                      </a:rPr>
+                      <m:t>𝑂</m:t>
+                    </m:r>
+                    <m:r>
+                      <a:rPr lang="en-US" sz="1800" i="1" dirty="0" smtClean="0">
+                        <a:latin typeface="Cambria Math" panose="02040503050406030204" pitchFamily="18" charset="0"/>
+                        <a:cs typeface="Calibri" panose="020F0502020204030204" pitchFamily="34" charset="0"/>
+                      </a:rPr>
+                      <m:t>(</m:t>
+                    </m:r>
+                    <m:r>
+                      <a:rPr lang="en-US" sz="1800" i="1" dirty="0" smtClean="0">
+                        <a:latin typeface="Cambria Math" panose="02040503050406030204" pitchFamily="18" charset="0"/>
+                        <a:cs typeface="Calibri" panose="020F0502020204030204" pitchFamily="34" charset="0"/>
+                      </a:rPr>
+                      <m:t>𝑚</m:t>
+                    </m:r>
+                    <m:r>
+                      <a:rPr lang="en-US" sz="1800" i="1" dirty="0" smtClean="0">
+                        <a:latin typeface="Cambria Math" panose="02040503050406030204" pitchFamily="18" charset="0"/>
+                        <a:cs typeface="Calibri" panose="020F0502020204030204" pitchFamily="34" charset="0"/>
+                      </a:rPr>
+                      <m:t>∗</m:t>
+                    </m:r>
+                    <m:r>
+                      <a:rPr lang="en-US" sz="1800" i="1" dirty="0" smtClean="0">
+                        <a:latin typeface="Cambria Math" panose="02040503050406030204" pitchFamily="18" charset="0"/>
+                        <a:cs typeface="Calibri" panose="020F0502020204030204" pitchFamily="34" charset="0"/>
+                      </a:rPr>
+                      <m:t>𝑛</m:t>
+                    </m:r>
+                    <m:r>
+                      <a:rPr lang="en-US" sz="1800" i="1" dirty="0" smtClean="0">
+                        <a:latin typeface="Cambria Math" panose="02040503050406030204" pitchFamily="18" charset="0"/>
+                        <a:cs typeface="Calibri" panose="020F0502020204030204" pitchFamily="34" charset="0"/>
+                      </a:rPr>
+                      <m:t>)</m:t>
+                    </m:r>
+                  </m:oMath>
+                </a14:m>
+                <a:endParaRPr lang="en-US" sz="1800" dirty="0">
+                  <a:latin typeface="Calibri" panose="020F0502020204030204" pitchFamily="34" charset="0"/>
+                  <a:cs typeface="Calibri" panose="020F0502020204030204" pitchFamily="34" charset="0"/>
+                </a:endParaRPr>
+              </a:p>
+              <a:p>
+                <a:pPr lvl="0" rtl="0">
+                  <a:spcBef>
+                    <a:spcPts val="0"/>
+                  </a:spcBef>
+                  <a:buNone/>
+                </a:pPr>
+                <a:endParaRPr sz="1800" dirty="0">
+                  <a:latin typeface="Calibri" panose="020F0502020204030204" pitchFamily="34" charset="0"/>
+                  <a:cs typeface="Calibri" panose="020F0502020204030204" pitchFamily="34" charset="0"/>
+                </a:endParaRPr>
+              </a:p>
+              <a:p>
+                <a:pPr lvl="0" rtl="0">
+                  <a:spcBef>
+                    <a:spcPts val="0"/>
+                  </a:spcBef>
+                  <a:buNone/>
+                </a:pPr>
+                <a:r>
+                  <a:rPr lang="en-US" sz="1800" dirty="0">
+                    <a:latin typeface="Calibri" panose="020F0502020204030204" pitchFamily="34" charset="0"/>
+                    <a:cs typeface="Calibri" panose="020F0502020204030204" pitchFamily="34" charset="0"/>
+                  </a:rPr>
+                  <a:t>D = </a:t>
+                </a:r>
+                <a14:m>
+                  <m:oMath xmlns:m="http://schemas.openxmlformats.org/officeDocument/2006/math">
+                    <m:r>
+                      <a:rPr lang="en-US" sz="1800" i="1" dirty="0" smtClean="0">
+                        <a:latin typeface="Cambria Math" panose="02040503050406030204" pitchFamily="18" charset="0"/>
+                        <a:cs typeface="Calibri" panose="020F0502020204030204" pitchFamily="34" charset="0"/>
+                      </a:rPr>
+                      <m:t>𝑂</m:t>
+                    </m:r>
+                    <m:r>
+                      <a:rPr lang="en-US" sz="1800" i="1" dirty="0" smtClean="0">
+                        <a:latin typeface="Cambria Math" panose="02040503050406030204" pitchFamily="18" charset="0"/>
+                        <a:cs typeface="Calibri" panose="020F0502020204030204" pitchFamily="34" charset="0"/>
+                      </a:rPr>
+                      <m:t>(</m:t>
+                    </m:r>
+                    <m:r>
+                      <a:rPr lang="en-US" sz="1800" i="1" dirty="0" smtClean="0">
+                        <a:latin typeface="Cambria Math" panose="02040503050406030204" pitchFamily="18" charset="0"/>
+                        <a:cs typeface="Calibri" panose="020F0502020204030204" pitchFamily="34" charset="0"/>
+                      </a:rPr>
+                      <m:t>𝑚</m:t>
+                    </m:r>
+                    <m:r>
+                      <a:rPr lang="en-US" sz="1800" i="1" dirty="0" smtClean="0">
+                        <a:latin typeface="Cambria Math" panose="02040503050406030204" pitchFamily="18" charset="0"/>
+                        <a:cs typeface="Calibri" panose="020F0502020204030204" pitchFamily="34" charset="0"/>
+                      </a:rPr>
+                      <m:t>)</m:t>
+                    </m:r>
+                  </m:oMath>
+                </a14:m>
+                <a:endParaRPr lang="en-US" sz="1800" dirty="0">
+                  <a:latin typeface="Calibri" panose="020F0502020204030204" pitchFamily="34" charset="0"/>
+                  <a:cs typeface="Calibri" panose="020F0502020204030204" pitchFamily="34" charset="0"/>
+                </a:endParaRPr>
+              </a:p>
+              <a:p>
+                <a:pPr lvl="0" rtl="0">
+                  <a:spcBef>
+                    <a:spcPts val="0"/>
+                  </a:spcBef>
+                  <a:buNone/>
+                </a:pPr>
+                <a:endParaRPr sz="1800" dirty="0">
+                  <a:latin typeface="Calibri" panose="020F0502020204030204" pitchFamily="34" charset="0"/>
+                  <a:cs typeface="Calibri" panose="020F0502020204030204" pitchFamily="34" charset="0"/>
+                </a:endParaRPr>
+              </a:p>
+              <a:p>
+                <a:pPr lvl="0" rtl="0">
+                  <a:spcBef>
+                    <a:spcPts val="0"/>
+                  </a:spcBef>
+                  <a:buNone/>
+                </a:pPr>
+                <a:r>
+                  <a:rPr lang="en-US" sz="1800" dirty="0">
+                    <a:latin typeface="Calibri" panose="020F0502020204030204" pitchFamily="34" charset="0"/>
+                    <a:cs typeface="Calibri" panose="020F0502020204030204" pitchFamily="34" charset="0"/>
+                  </a:rPr>
+                  <a:t>avg. par. = </a:t>
+                </a:r>
+                <a14:m>
+                  <m:oMath xmlns:m="http://schemas.openxmlformats.org/officeDocument/2006/math">
+                    <m:r>
+                      <a:rPr lang="en-US" sz="1800" i="1" dirty="0" smtClean="0">
+                        <a:latin typeface="Cambria Math" panose="02040503050406030204" pitchFamily="18" charset="0"/>
+                        <a:cs typeface="Calibri" panose="020F0502020204030204" pitchFamily="34" charset="0"/>
+                      </a:rPr>
+                      <m:t>𝑂</m:t>
+                    </m:r>
+                    <m:r>
+                      <a:rPr lang="en-US" sz="1800" i="1" dirty="0" smtClean="0">
+                        <a:latin typeface="Cambria Math" panose="02040503050406030204" pitchFamily="18" charset="0"/>
+                        <a:cs typeface="Calibri" panose="020F0502020204030204" pitchFamily="34" charset="0"/>
+                      </a:rPr>
+                      <m:t>(</m:t>
+                    </m:r>
+                    <m:r>
+                      <a:rPr lang="en-US" sz="1800" i="1" dirty="0" smtClean="0">
+                        <a:latin typeface="Cambria Math" panose="02040503050406030204" pitchFamily="18" charset="0"/>
+                        <a:cs typeface="Calibri" panose="020F0502020204030204" pitchFamily="34" charset="0"/>
+                      </a:rPr>
+                      <m:t>𝑛</m:t>
+                    </m:r>
+                    <m:r>
+                      <a:rPr lang="en-US" sz="1800" i="1" dirty="0" smtClean="0">
+                        <a:latin typeface="Cambria Math" panose="02040503050406030204" pitchFamily="18" charset="0"/>
+                        <a:cs typeface="Calibri" panose="020F0502020204030204" pitchFamily="34" charset="0"/>
+                      </a:rPr>
+                      <m:t>)</m:t>
+                    </m:r>
+                  </m:oMath>
+                </a14:m>
+                <a:endParaRPr lang="en-US" sz="1800" dirty="0">
+                  <a:latin typeface="Calibri" panose="020F0502020204030204" pitchFamily="34" charset="0"/>
+                  <a:cs typeface="Calibri" panose="020F0502020204030204" pitchFamily="34" charset="0"/>
+                </a:endParaRPr>
+              </a:p>
+            </p:txBody>
+          </p:sp>
+        </mc:Choice>
+        <mc:Fallback xmlns="">
+          <p:sp>
+            <p:nvSpPr>
+              <p:cNvPr id="339" name="Shape 339"/>
+              <p:cNvSpPr txBox="1">
+                <a:spLocks noRot="1" noChangeAspect="1" noMove="1" noResize="1" noEditPoints="1" noAdjustHandles="1" noChangeArrowheads="1" noChangeShapeType="1" noTextEdit="1"/>
+              </p:cNvSpPr>
+              <p:nvPr/>
+            </p:nvSpPr>
+            <p:spPr>
+              <a:xfrm>
+                <a:off x="2326750" y="2774025"/>
+                <a:ext cx="1881600" cy="2783400"/>
+              </a:xfrm>
+              <a:prstGeom prst="rect">
+                <a:avLst/>
+              </a:prstGeom>
+              <a:blipFill>
+                <a:blip r:embed="rId4"/>
+                <a:stretch>
+                  <a:fillRect l="-2922"/>
+                </a:stretch>
+              </a:blipFill>
+              <a:ln>
+                <a:noFill/>
+              </a:ln>
+            </p:spPr>
+            <p:txBody>
+              <a:bodyPr/>
+              <a:lstStyle/>
+              <a:p>
+                <a:r>
+                  <a:rPr lang="en-US">
+                    <a:noFill/>
+                  </a:rPr>
+                  <a:t> </a:t>
+                </a:r>
+              </a:p>
+            </p:txBody>
+          </p:sp>
+        </mc:Fallback>
+      </mc:AlternateContent>
       <p:sp>
         <p:nvSpPr>
           <p:cNvPr id="340" name="Shape 340"/>

</xml_diff>